<commit_message>
Modified the presentation, and moved some things in the r file
</commit_message>
<xml_diff>
--- a/COMP4441 Presentation.pptx
+++ b/COMP4441 Presentation.pptx
@@ -4,6 +4,9 @@
   <p:sldMasterIdLst>
     <p:sldMasterId id="2147483699" r:id="rId1"/>
   </p:sldMasterIdLst>
+  <p:notesMasterIdLst>
+    <p:notesMasterId r:id="rId19"/>
+  </p:notesMasterIdLst>
   <p:sldIdLst>
     <p:sldId id="256" r:id="rId2"/>
     <p:sldId id="257" r:id="rId3"/>
@@ -16,11 +19,12 @@
     <p:sldId id="268" r:id="rId10"/>
     <p:sldId id="270" r:id="rId11"/>
     <p:sldId id="269" r:id="rId12"/>
-    <p:sldId id="271" r:id="rId13"/>
-    <p:sldId id="266" r:id="rId14"/>
-    <p:sldId id="263" r:id="rId15"/>
-    <p:sldId id="264" r:id="rId16"/>
-    <p:sldId id="265" r:id="rId17"/>
+    <p:sldId id="272" r:id="rId13"/>
+    <p:sldId id="271" r:id="rId14"/>
+    <p:sldId id="266" r:id="rId15"/>
+    <p:sldId id="263" r:id="rId16"/>
+    <p:sldId id="264" r:id="rId17"/>
+    <p:sldId id="265" r:id="rId18"/>
   </p:sldIdLst>
   <p:sldSz cx="12192000" cy="6858000"/>
   <p:notesSz cx="6858000" cy="9144000"/>
@@ -119,7 +123,1521 @@
       </a:defRPr>
     </a:lvl9pPr>
   </p:defaultTextStyle>
+  <p:extLst>
+    <p:ext uri="{EFAFB233-063F-42B5-8137-9DF3F51BA10A}">
+      <p15:sldGuideLst xmlns:p15="http://schemas.microsoft.com/office/powerpoint/2012/main">
+        <p15:guide id="1" orient="horz" pos="2160" userDrawn="1">
+          <p15:clr>
+            <a:srgbClr val="A4A3A4"/>
+          </p15:clr>
+        </p15:guide>
+        <p15:guide id="2" pos="3840" userDrawn="1">
+          <p15:clr>
+            <a:srgbClr val="A4A3A4"/>
+          </p15:clr>
+        </p15:guide>
+      </p15:sldGuideLst>
+    </p:ext>
+  </p:extLst>
 </p:presentation>
+</file>
+
+<file path=ppt/revisionInfo.xml><?xml version="1.0" encoding="utf-8"?>
+<p1510:revInfo xmlns:a="http://schemas.openxmlformats.org/drawingml/2006/main" xmlns:r="http://schemas.openxmlformats.org/officeDocument/2006/relationships" xmlns:p1510="http://schemas.microsoft.com/office/powerpoint/2015/10/main">
+  <p1510:revLst>
+    <p1510:client id="{D3D60B49-FF84-479B-8288-809CE669EB7A}" v="1" dt="2023-03-05T09:59:31.971"/>
+  </p1510:revLst>
+</p1510:revInfo>
+</file>
+
+<file path=ppt/changesInfos/changesInfo1.xml><?xml version="1.0" encoding="utf-8"?>
+<pc:chgInfo xmlns:a="http://schemas.openxmlformats.org/drawingml/2006/main" xmlns:r="http://schemas.openxmlformats.org/officeDocument/2006/relationships" xmlns:ac="http://schemas.microsoft.com/office/drawing/2013/main/command" xmlns:pc="http://schemas.microsoft.com/office/powerpoint/2013/main/command">
+  <pc:docChgLst>
+    <pc:chgData name="Heriberto Antonio Dehesa Ortiz" userId="a30f474c66d887a4" providerId="LiveId" clId="{D3D60B49-FF84-479B-8288-809CE669EB7A}"/>
+    <pc:docChg chg="undo custSel addSld modSld">
+      <pc:chgData name="Heriberto Antonio Dehesa Ortiz" userId="a30f474c66d887a4" providerId="LiveId" clId="{D3D60B49-FF84-479B-8288-809CE669EB7A}" dt="2023-03-05T11:03:31.475" v="4457" actId="26606"/>
+      <pc:docMkLst>
+        <pc:docMk/>
+      </pc:docMkLst>
+      <pc:sldChg chg="modNotesTx">
+        <pc:chgData name="Heriberto Antonio Dehesa Ortiz" userId="a30f474c66d887a4" providerId="LiveId" clId="{D3D60B49-FF84-479B-8288-809CE669EB7A}" dt="2023-03-05T10:21:45.098" v="2551" actId="20577"/>
+        <pc:sldMkLst>
+          <pc:docMk/>
+          <pc:sldMk cId="1176498248" sldId="257"/>
+        </pc:sldMkLst>
+      </pc:sldChg>
+      <pc:sldChg chg="modNotesTx">
+        <pc:chgData name="Heriberto Antonio Dehesa Ortiz" userId="a30f474c66d887a4" providerId="LiveId" clId="{D3D60B49-FF84-479B-8288-809CE669EB7A}" dt="2023-03-05T10:26:12.815" v="2856" actId="20577"/>
+        <pc:sldMkLst>
+          <pc:docMk/>
+          <pc:sldMk cId="2976135784" sldId="258"/>
+        </pc:sldMkLst>
+      </pc:sldChg>
+      <pc:sldChg chg="modNotesTx">
+        <pc:chgData name="Heriberto Antonio Dehesa Ortiz" userId="a30f474c66d887a4" providerId="LiveId" clId="{D3D60B49-FF84-479B-8288-809CE669EB7A}" dt="2023-03-05T09:36:43.943" v="525" actId="20577"/>
+        <pc:sldMkLst>
+          <pc:docMk/>
+          <pc:sldMk cId="76469484" sldId="259"/>
+        </pc:sldMkLst>
+      </pc:sldChg>
+      <pc:sldChg chg="modNotesTx">
+        <pc:chgData name="Heriberto Antonio Dehesa Ortiz" userId="a30f474c66d887a4" providerId="LiveId" clId="{D3D60B49-FF84-479B-8288-809CE669EB7A}" dt="2023-03-05T09:49:59.667" v="900" actId="20577"/>
+        <pc:sldMkLst>
+          <pc:docMk/>
+          <pc:sldMk cId="2756658838" sldId="260"/>
+        </pc:sldMkLst>
+      </pc:sldChg>
+      <pc:sldChg chg="modNotesTx">
+        <pc:chgData name="Heriberto Antonio Dehesa Ortiz" userId="a30f474c66d887a4" providerId="LiveId" clId="{D3D60B49-FF84-479B-8288-809CE669EB7A}" dt="2023-03-05T09:56:37.525" v="1180" actId="20577"/>
+        <pc:sldMkLst>
+          <pc:docMk/>
+          <pc:sldMk cId="1121921362" sldId="261"/>
+        </pc:sldMkLst>
+      </pc:sldChg>
+      <pc:sldChg chg="addSp delSp modSp mod modNotesTx">
+        <pc:chgData name="Heriberto Antonio Dehesa Ortiz" userId="a30f474c66d887a4" providerId="LiveId" clId="{D3D60B49-FF84-479B-8288-809CE669EB7A}" dt="2023-03-05T10:04:34.092" v="1628" actId="20577"/>
+        <pc:sldMkLst>
+          <pc:docMk/>
+          <pc:sldMk cId="3430871019" sldId="262"/>
+        </pc:sldMkLst>
+        <pc:spChg chg="mod">
+          <ac:chgData name="Heriberto Antonio Dehesa Ortiz" userId="a30f474c66d887a4" providerId="LiveId" clId="{D3D60B49-FF84-479B-8288-809CE669EB7A}" dt="2023-03-05T10:04:05.938" v="1529" actId="20577"/>
+          <ac:spMkLst>
+            <pc:docMk/>
+            <pc:sldMk cId="3430871019" sldId="262"/>
+            <ac:spMk id="2" creationId="{F89FF7A1-C1B1-D24F-C474-CD0A4D87B892}"/>
+          </ac:spMkLst>
+        </pc:spChg>
+        <pc:spChg chg="del">
+          <ac:chgData name="Heriberto Antonio Dehesa Ortiz" userId="a30f474c66d887a4" providerId="LiveId" clId="{D3D60B49-FF84-479B-8288-809CE669EB7A}" dt="2023-03-05T09:59:29.798" v="1181" actId="478"/>
+          <ac:spMkLst>
+            <pc:docMk/>
+            <pc:sldMk cId="3430871019" sldId="262"/>
+            <ac:spMk id="3" creationId="{403B4C96-2620-56CA-3DC8-347420A72FBF}"/>
+          </ac:spMkLst>
+        </pc:spChg>
+        <pc:picChg chg="add mod">
+          <ac:chgData name="Heriberto Antonio Dehesa Ortiz" userId="a30f474c66d887a4" providerId="LiveId" clId="{D3D60B49-FF84-479B-8288-809CE669EB7A}" dt="2023-03-05T10:00:01.909" v="1190" actId="1076"/>
+          <ac:picMkLst>
+            <pc:docMk/>
+            <pc:sldMk cId="3430871019" sldId="262"/>
+            <ac:picMk id="5" creationId="{08834197-ED68-6611-27A6-7DDFE230301B}"/>
+          </ac:picMkLst>
+        </pc:picChg>
+      </pc:sldChg>
+      <pc:sldChg chg="modNotesTx">
+        <pc:chgData name="Heriberto Antonio Dehesa Ortiz" userId="a30f474c66d887a4" providerId="LiveId" clId="{D3D60B49-FF84-479B-8288-809CE669EB7A}" dt="2023-03-05T10:40:12.092" v="3660" actId="20577"/>
+        <pc:sldMkLst>
+          <pc:docMk/>
+          <pc:sldMk cId="304808437" sldId="267"/>
+        </pc:sldMkLst>
+      </pc:sldChg>
+      <pc:sldChg chg="modNotesTx">
+        <pc:chgData name="Heriberto Antonio Dehesa Ortiz" userId="a30f474c66d887a4" providerId="LiveId" clId="{D3D60B49-FF84-479B-8288-809CE669EB7A}" dt="2023-03-05T10:43:50.980" v="3819" actId="20577"/>
+        <pc:sldMkLst>
+          <pc:docMk/>
+          <pc:sldMk cId="1810218577" sldId="268"/>
+        </pc:sldMkLst>
+      </pc:sldChg>
+      <pc:sldChg chg="modSp mod">
+        <pc:chgData name="Heriberto Antonio Dehesa Ortiz" userId="a30f474c66d887a4" providerId="LiveId" clId="{D3D60B49-FF84-479B-8288-809CE669EB7A}" dt="2023-03-05T10:49:17.440" v="4122" actId="20577"/>
+        <pc:sldMkLst>
+          <pc:docMk/>
+          <pc:sldMk cId="2461509130" sldId="269"/>
+        </pc:sldMkLst>
+        <pc:spChg chg="mod">
+          <ac:chgData name="Heriberto Antonio Dehesa Ortiz" userId="a30f474c66d887a4" providerId="LiveId" clId="{D3D60B49-FF84-479B-8288-809CE669EB7A}" dt="2023-03-05T10:49:17.440" v="4122" actId="20577"/>
+          <ac:spMkLst>
+            <pc:docMk/>
+            <pc:sldMk cId="2461509130" sldId="269"/>
+            <ac:spMk id="3" creationId="{BE8EF69F-9378-AB6C-1A95-9AB831D465B3}"/>
+          </ac:spMkLst>
+        </pc:spChg>
+      </pc:sldChg>
+      <pc:sldChg chg="modNotesTx">
+        <pc:chgData name="Heriberto Antonio Dehesa Ortiz" userId="a30f474c66d887a4" providerId="LiveId" clId="{D3D60B49-FF84-479B-8288-809CE669EB7A}" dt="2023-03-05T10:44:29.217" v="3932" actId="20577"/>
+        <pc:sldMkLst>
+          <pc:docMk/>
+          <pc:sldMk cId="4272088750" sldId="270"/>
+        </pc:sldMkLst>
+      </pc:sldChg>
+      <pc:sldChg chg="addSp delSp modSp add mod setBg">
+        <pc:chgData name="Heriberto Antonio Dehesa Ortiz" userId="a30f474c66d887a4" providerId="LiveId" clId="{D3D60B49-FF84-479B-8288-809CE669EB7A}" dt="2023-03-05T11:03:31.475" v="4457" actId="26606"/>
+        <pc:sldMkLst>
+          <pc:docMk/>
+          <pc:sldMk cId="822615812" sldId="272"/>
+        </pc:sldMkLst>
+        <pc:spChg chg="mod">
+          <ac:chgData name="Heriberto Antonio Dehesa Ortiz" userId="a30f474c66d887a4" providerId="LiveId" clId="{D3D60B49-FF84-479B-8288-809CE669EB7A}" dt="2023-03-05T11:03:31.475" v="4457" actId="26606"/>
+          <ac:spMkLst>
+            <pc:docMk/>
+            <pc:sldMk cId="822615812" sldId="272"/>
+            <ac:spMk id="2" creationId="{B358E8B0-D708-DE68-C1C5-D80A3353323C}"/>
+          </ac:spMkLst>
+        </pc:spChg>
+        <pc:spChg chg="mod">
+          <ac:chgData name="Heriberto Antonio Dehesa Ortiz" userId="a30f474c66d887a4" providerId="LiveId" clId="{D3D60B49-FF84-479B-8288-809CE669EB7A}" dt="2023-03-05T11:03:31.475" v="4457" actId="26606"/>
+          <ac:spMkLst>
+            <pc:docMk/>
+            <pc:sldMk cId="822615812" sldId="272"/>
+            <ac:spMk id="3" creationId="{BE8EF69F-9378-AB6C-1A95-9AB831D465B3}"/>
+          </ac:spMkLst>
+        </pc:spChg>
+        <pc:spChg chg="add del">
+          <ac:chgData name="Heriberto Antonio Dehesa Ortiz" userId="a30f474c66d887a4" providerId="LiveId" clId="{D3D60B49-FF84-479B-8288-809CE669EB7A}" dt="2023-03-05T11:03:31.475" v="4457" actId="26606"/>
+          <ac:spMkLst>
+            <pc:docMk/>
+            <pc:sldMk cId="822615812" sldId="272"/>
+            <ac:spMk id="10" creationId="{FE90AC20-7A25-4729-AF8D-9E79559BBC96}"/>
+          </ac:spMkLst>
+        </pc:spChg>
+        <pc:spChg chg="add del">
+          <ac:chgData name="Heriberto Antonio Dehesa Ortiz" userId="a30f474c66d887a4" providerId="LiveId" clId="{D3D60B49-FF84-479B-8288-809CE669EB7A}" dt="2023-03-05T11:03:31.471" v="4456" actId="26606"/>
+          <ac:spMkLst>
+            <pc:docMk/>
+            <pc:sldMk cId="822615812" sldId="272"/>
+            <ac:spMk id="18" creationId="{2A4F745F-6DDB-413A-9BDC-D6B6E768AB4F}"/>
+          </ac:spMkLst>
+        </pc:spChg>
+        <pc:spChg chg="add">
+          <ac:chgData name="Heriberto Antonio Dehesa Ortiz" userId="a30f474c66d887a4" providerId="LiveId" clId="{D3D60B49-FF84-479B-8288-809CE669EB7A}" dt="2023-03-05T11:03:31.475" v="4457" actId="26606"/>
+          <ac:spMkLst>
+            <pc:docMk/>
+            <pc:sldMk cId="822615812" sldId="272"/>
+            <ac:spMk id="22" creationId="{2A6A41AD-B3AC-47B3-BC30-A29086AF2C5C}"/>
+          </ac:spMkLst>
+        </pc:spChg>
+        <pc:picChg chg="add mod">
+          <ac:chgData name="Heriberto Antonio Dehesa Ortiz" userId="a30f474c66d887a4" providerId="LiveId" clId="{D3D60B49-FF84-479B-8288-809CE669EB7A}" dt="2023-03-05T11:03:31.475" v="4457" actId="26606"/>
+          <ac:picMkLst>
+            <pc:docMk/>
+            <pc:sldMk cId="822615812" sldId="272"/>
+            <ac:picMk id="5" creationId="{D1300A37-E8BE-9EC9-D6B6-686CBC2B08F5}"/>
+          </ac:picMkLst>
+        </pc:picChg>
+        <pc:picChg chg="add mod ord">
+          <ac:chgData name="Heriberto Antonio Dehesa Ortiz" userId="a30f474c66d887a4" providerId="LiveId" clId="{D3D60B49-FF84-479B-8288-809CE669EB7A}" dt="2023-03-05T11:03:31.475" v="4457" actId="26606"/>
+          <ac:picMkLst>
+            <pc:docMk/>
+            <pc:sldMk cId="822615812" sldId="272"/>
+            <ac:picMk id="7" creationId="{817DC601-0B03-4B4A-6752-E8BDCF39F6D1}"/>
+          </ac:picMkLst>
+        </pc:picChg>
+        <pc:picChg chg="add del">
+          <ac:chgData name="Heriberto Antonio Dehesa Ortiz" userId="a30f474c66d887a4" providerId="LiveId" clId="{D3D60B49-FF84-479B-8288-809CE669EB7A}" dt="2023-03-05T11:03:17.369" v="4453" actId="22"/>
+          <ac:picMkLst>
+            <pc:docMk/>
+            <pc:sldMk cId="822615812" sldId="272"/>
+            <ac:picMk id="9" creationId="{FE332B49-89FE-B777-54C6-A3C6C9A79F2B}"/>
+          </ac:picMkLst>
+        </pc:picChg>
+        <pc:picChg chg="add mod">
+          <ac:chgData name="Heriberto Antonio Dehesa Ortiz" userId="a30f474c66d887a4" providerId="LiveId" clId="{D3D60B49-FF84-479B-8288-809CE669EB7A}" dt="2023-03-05T11:03:31.475" v="4457" actId="26606"/>
+          <ac:picMkLst>
+            <pc:docMk/>
+            <pc:sldMk cId="822615812" sldId="272"/>
+            <ac:picMk id="13" creationId="{FE4BCA27-80D4-9E8C-68DF-B8E70EB78EDC}"/>
+          </ac:picMkLst>
+        </pc:picChg>
+        <pc:cxnChg chg="add del">
+          <ac:chgData name="Heriberto Antonio Dehesa Ortiz" userId="a30f474c66d887a4" providerId="LiveId" clId="{D3D60B49-FF84-479B-8288-809CE669EB7A}" dt="2023-03-05T11:03:31.475" v="4457" actId="26606"/>
+          <ac:cxnSpMkLst>
+            <pc:docMk/>
+            <pc:sldMk cId="822615812" sldId="272"/>
+            <ac:cxnSpMk id="12" creationId="{7F935FD8-9F2E-4F15-8ED9-1C692DA6F351}"/>
+          </ac:cxnSpMkLst>
+        </pc:cxnChg>
+        <pc:cxnChg chg="add del">
+          <ac:chgData name="Heriberto Antonio Dehesa Ortiz" userId="a30f474c66d887a4" providerId="LiveId" clId="{D3D60B49-FF84-479B-8288-809CE669EB7A}" dt="2023-03-05T11:03:31.471" v="4456" actId="26606"/>
+          <ac:cxnSpMkLst>
+            <pc:docMk/>
+            <pc:sldMk cId="822615812" sldId="272"/>
+            <ac:cxnSpMk id="20" creationId="{B32E796E-8D19-4926-B7B8-653B01939010}"/>
+          </ac:cxnSpMkLst>
+        </pc:cxnChg>
+        <pc:cxnChg chg="add">
+          <ac:chgData name="Heriberto Antonio Dehesa Ortiz" userId="a30f474c66d887a4" providerId="LiveId" clId="{D3D60B49-FF84-479B-8288-809CE669EB7A}" dt="2023-03-05T11:03:31.475" v="4457" actId="26606"/>
+          <ac:cxnSpMkLst>
+            <pc:docMk/>
+            <pc:sldMk cId="822615812" sldId="272"/>
+            <ac:cxnSpMk id="23" creationId="{B32E796E-8D19-4926-B7B8-653B01939010}"/>
+          </ac:cxnSpMkLst>
+        </pc:cxnChg>
+      </pc:sldChg>
+    </pc:docChg>
+  </pc:docChgLst>
+</pc:chgInfo>
+</file>
+
+<file path=ppt/notesMasters/notesMaster1.xml><?xml version="1.0" encoding="utf-8"?>
+<p:notesMaster xmlns:a="http://schemas.openxmlformats.org/drawingml/2006/main" xmlns:r="http://schemas.openxmlformats.org/officeDocument/2006/relationships" xmlns:p="http://schemas.openxmlformats.org/presentationml/2006/main">
+  <p:cSld>
+    <p:bg>
+      <p:bgRef idx="1001">
+        <a:schemeClr val="bg1"/>
+      </p:bgRef>
+    </p:bg>
+    <p:spTree>
+      <p:nvGrpSpPr>
+        <p:cNvPr id="1" name=""/>
+        <p:cNvGrpSpPr/>
+        <p:nvPr/>
+      </p:nvGrpSpPr>
+      <p:grpSpPr>
+        <a:xfrm>
+          <a:off x="0" y="0"/>
+          <a:ext cx="0" cy="0"/>
+          <a:chOff x="0" y="0"/>
+          <a:chExt cx="0" cy="0"/>
+        </a:xfrm>
+      </p:grpSpPr>
+      <p:sp>
+        <p:nvSpPr>
+          <p:cNvPr id="2" name="Marcador de encabezado 1"/>
+          <p:cNvSpPr>
+            <a:spLocks noGrp="1"/>
+          </p:cNvSpPr>
+          <p:nvPr>
+            <p:ph type="hdr" sz="quarter"/>
+          </p:nvPr>
+        </p:nvSpPr>
+        <p:spPr>
+          <a:xfrm>
+            <a:off x="0" y="0"/>
+            <a:ext cx="2971800" cy="458788"/>
+          </a:xfrm>
+          <a:prstGeom prst="rect">
+            <a:avLst/>
+          </a:prstGeom>
+        </p:spPr>
+        <p:txBody>
+          <a:bodyPr vert="horz" lIns="91440" tIns="45720" rIns="91440" bIns="45720" rtlCol="0"/>
+          <a:lstStyle>
+            <a:lvl1pPr algn="l">
+              <a:defRPr sz="1200"/>
+            </a:lvl1pPr>
+          </a:lstStyle>
+          <a:p>
+            <a:endParaRPr lang="es-MX"/>
+          </a:p>
+        </p:txBody>
+      </p:sp>
+      <p:sp>
+        <p:nvSpPr>
+          <p:cNvPr id="3" name="Marcador de fecha 2"/>
+          <p:cNvSpPr>
+            <a:spLocks noGrp="1"/>
+          </p:cNvSpPr>
+          <p:nvPr>
+            <p:ph type="dt" idx="1"/>
+          </p:nvPr>
+        </p:nvSpPr>
+        <p:spPr>
+          <a:xfrm>
+            <a:off x="3884613" y="0"/>
+            <a:ext cx="2971800" cy="458788"/>
+          </a:xfrm>
+          <a:prstGeom prst="rect">
+            <a:avLst/>
+          </a:prstGeom>
+        </p:spPr>
+        <p:txBody>
+          <a:bodyPr vert="horz" lIns="91440" tIns="45720" rIns="91440" bIns="45720" rtlCol="0"/>
+          <a:lstStyle>
+            <a:lvl1pPr algn="r">
+              <a:defRPr sz="1200"/>
+            </a:lvl1pPr>
+          </a:lstStyle>
+          <a:p>
+            <a:fld id="{FA89E701-7D7B-44D0-BD55-0E0AC6A512B5}" type="datetimeFigureOut">
+              <a:rPr lang="es-MX" smtClean="0"/>
+              <a:t>05/03/2023</a:t>
+            </a:fld>
+            <a:endParaRPr lang="es-MX"/>
+          </a:p>
+        </p:txBody>
+      </p:sp>
+      <p:sp>
+        <p:nvSpPr>
+          <p:cNvPr id="4" name="Marcador de imagen de diapositiva 3"/>
+          <p:cNvSpPr>
+            <a:spLocks noGrp="1" noRot="1" noChangeAspect="1"/>
+          </p:cNvSpPr>
+          <p:nvPr>
+            <p:ph type="sldImg" idx="2"/>
+          </p:nvPr>
+        </p:nvSpPr>
+        <p:spPr>
+          <a:xfrm>
+            <a:off x="685800" y="1143000"/>
+            <a:ext cx="5486400" cy="3086100"/>
+          </a:xfrm>
+          <a:prstGeom prst="rect">
+            <a:avLst/>
+          </a:prstGeom>
+          <a:noFill/>
+          <a:ln w="12700">
+            <a:solidFill>
+              <a:prstClr val="black"/>
+            </a:solidFill>
+          </a:ln>
+        </p:spPr>
+        <p:txBody>
+          <a:bodyPr vert="horz" lIns="91440" tIns="45720" rIns="91440" bIns="45720" rtlCol="0" anchor="ctr"/>
+          <a:lstStyle/>
+          <a:p>
+            <a:endParaRPr lang="es-MX"/>
+          </a:p>
+        </p:txBody>
+      </p:sp>
+      <p:sp>
+        <p:nvSpPr>
+          <p:cNvPr id="5" name="Marcador de notas 4"/>
+          <p:cNvSpPr>
+            <a:spLocks noGrp="1"/>
+          </p:cNvSpPr>
+          <p:nvPr>
+            <p:ph type="body" sz="quarter" idx="3"/>
+          </p:nvPr>
+        </p:nvSpPr>
+        <p:spPr>
+          <a:xfrm>
+            <a:off x="685800" y="4400550"/>
+            <a:ext cx="5486400" cy="3600450"/>
+          </a:xfrm>
+          <a:prstGeom prst="rect">
+            <a:avLst/>
+          </a:prstGeom>
+        </p:spPr>
+        <p:txBody>
+          <a:bodyPr vert="horz" lIns="91440" tIns="45720" rIns="91440" bIns="45720" rtlCol="0"/>
+          <a:lstStyle/>
+          <a:p>
+            <a:pPr lvl="0"/>
+            <a:r>
+              <a:rPr lang="es-ES"/>
+              <a:t>Haga clic para modificar los estilos de texto del patrón</a:t>
+            </a:r>
+          </a:p>
+          <a:p>
+            <a:pPr lvl="1"/>
+            <a:r>
+              <a:rPr lang="es-ES"/>
+              <a:t>Segundo nivel</a:t>
+            </a:r>
+          </a:p>
+          <a:p>
+            <a:pPr lvl="2"/>
+            <a:r>
+              <a:rPr lang="es-ES"/>
+              <a:t>Tercer nivel</a:t>
+            </a:r>
+          </a:p>
+          <a:p>
+            <a:pPr lvl="3"/>
+            <a:r>
+              <a:rPr lang="es-ES"/>
+              <a:t>Cuarto nivel</a:t>
+            </a:r>
+          </a:p>
+          <a:p>
+            <a:pPr lvl="4"/>
+            <a:r>
+              <a:rPr lang="es-ES"/>
+              <a:t>Quinto nivel</a:t>
+            </a:r>
+            <a:endParaRPr lang="es-MX"/>
+          </a:p>
+        </p:txBody>
+      </p:sp>
+      <p:sp>
+        <p:nvSpPr>
+          <p:cNvPr id="6" name="Marcador de pie de página 5"/>
+          <p:cNvSpPr>
+            <a:spLocks noGrp="1"/>
+          </p:cNvSpPr>
+          <p:nvPr>
+            <p:ph type="ftr" sz="quarter" idx="4"/>
+          </p:nvPr>
+        </p:nvSpPr>
+        <p:spPr>
+          <a:xfrm>
+            <a:off x="0" y="8685213"/>
+            <a:ext cx="2971800" cy="458787"/>
+          </a:xfrm>
+          <a:prstGeom prst="rect">
+            <a:avLst/>
+          </a:prstGeom>
+        </p:spPr>
+        <p:txBody>
+          <a:bodyPr vert="horz" lIns="91440" tIns="45720" rIns="91440" bIns="45720" rtlCol="0" anchor="b"/>
+          <a:lstStyle>
+            <a:lvl1pPr algn="l">
+              <a:defRPr sz="1200"/>
+            </a:lvl1pPr>
+          </a:lstStyle>
+          <a:p>
+            <a:endParaRPr lang="es-MX"/>
+          </a:p>
+        </p:txBody>
+      </p:sp>
+      <p:sp>
+        <p:nvSpPr>
+          <p:cNvPr id="7" name="Marcador de número de diapositiva 6"/>
+          <p:cNvSpPr>
+            <a:spLocks noGrp="1"/>
+          </p:cNvSpPr>
+          <p:nvPr>
+            <p:ph type="sldNum" sz="quarter" idx="5"/>
+          </p:nvPr>
+        </p:nvSpPr>
+        <p:spPr>
+          <a:xfrm>
+            <a:off x="3884613" y="8685213"/>
+            <a:ext cx="2971800" cy="458787"/>
+          </a:xfrm>
+          <a:prstGeom prst="rect">
+            <a:avLst/>
+          </a:prstGeom>
+        </p:spPr>
+        <p:txBody>
+          <a:bodyPr vert="horz" lIns="91440" tIns="45720" rIns="91440" bIns="45720" rtlCol="0" anchor="b"/>
+          <a:lstStyle>
+            <a:lvl1pPr algn="r">
+              <a:defRPr sz="1200"/>
+            </a:lvl1pPr>
+          </a:lstStyle>
+          <a:p>
+            <a:fld id="{B1B86416-57AC-4DAC-BB64-521FF3D998C4}" type="slidenum">
+              <a:rPr lang="es-MX" smtClean="0"/>
+              <a:t>‹Nº›</a:t>
+            </a:fld>
+            <a:endParaRPr lang="es-MX"/>
+          </a:p>
+        </p:txBody>
+      </p:sp>
+    </p:spTree>
+    <p:extLst>
+      <p:ext uri="{BB962C8B-B14F-4D97-AF65-F5344CB8AC3E}">
+        <p14:creationId xmlns:p14="http://schemas.microsoft.com/office/powerpoint/2010/main" val="1592710578"/>
+      </p:ext>
+    </p:extLst>
+  </p:cSld>
+  <p:clrMap bg1="lt1" tx1="dk1" bg2="lt2" tx2="dk2" accent1="accent1" accent2="accent2" accent3="accent3" accent4="accent4" accent5="accent5" accent6="accent6" hlink="hlink" folHlink="folHlink"/>
+  <p:notesStyle>
+    <a:lvl1pPr marL="0" algn="l" defTabSz="914400" rtl="0" eaLnBrk="1" latinLnBrk="0" hangingPunct="1">
+      <a:defRPr sz="1200" kern="1200">
+        <a:solidFill>
+          <a:schemeClr val="tx1"/>
+        </a:solidFill>
+        <a:latin typeface="+mn-lt"/>
+        <a:ea typeface="+mn-ea"/>
+        <a:cs typeface="+mn-cs"/>
+      </a:defRPr>
+    </a:lvl1pPr>
+    <a:lvl2pPr marL="457200" algn="l" defTabSz="914400" rtl="0" eaLnBrk="1" latinLnBrk="0" hangingPunct="1">
+      <a:defRPr sz="1200" kern="1200">
+        <a:solidFill>
+          <a:schemeClr val="tx1"/>
+        </a:solidFill>
+        <a:latin typeface="+mn-lt"/>
+        <a:ea typeface="+mn-ea"/>
+        <a:cs typeface="+mn-cs"/>
+      </a:defRPr>
+    </a:lvl2pPr>
+    <a:lvl3pPr marL="914400" algn="l" defTabSz="914400" rtl="0" eaLnBrk="1" latinLnBrk="0" hangingPunct="1">
+      <a:defRPr sz="1200" kern="1200">
+        <a:solidFill>
+          <a:schemeClr val="tx1"/>
+        </a:solidFill>
+        <a:latin typeface="+mn-lt"/>
+        <a:ea typeface="+mn-ea"/>
+        <a:cs typeface="+mn-cs"/>
+      </a:defRPr>
+    </a:lvl3pPr>
+    <a:lvl4pPr marL="1371600" algn="l" defTabSz="914400" rtl="0" eaLnBrk="1" latinLnBrk="0" hangingPunct="1">
+      <a:defRPr sz="1200" kern="1200">
+        <a:solidFill>
+          <a:schemeClr val="tx1"/>
+        </a:solidFill>
+        <a:latin typeface="+mn-lt"/>
+        <a:ea typeface="+mn-ea"/>
+        <a:cs typeface="+mn-cs"/>
+      </a:defRPr>
+    </a:lvl4pPr>
+    <a:lvl5pPr marL="1828800" algn="l" defTabSz="914400" rtl="0" eaLnBrk="1" latinLnBrk="0" hangingPunct="1">
+      <a:defRPr sz="1200" kern="1200">
+        <a:solidFill>
+          <a:schemeClr val="tx1"/>
+        </a:solidFill>
+        <a:latin typeface="+mn-lt"/>
+        <a:ea typeface="+mn-ea"/>
+        <a:cs typeface="+mn-cs"/>
+      </a:defRPr>
+    </a:lvl5pPr>
+    <a:lvl6pPr marL="2286000" algn="l" defTabSz="914400" rtl="0" eaLnBrk="1" latinLnBrk="0" hangingPunct="1">
+      <a:defRPr sz="1200" kern="1200">
+        <a:solidFill>
+          <a:schemeClr val="tx1"/>
+        </a:solidFill>
+        <a:latin typeface="+mn-lt"/>
+        <a:ea typeface="+mn-ea"/>
+        <a:cs typeface="+mn-cs"/>
+      </a:defRPr>
+    </a:lvl6pPr>
+    <a:lvl7pPr marL="2743200" algn="l" defTabSz="914400" rtl="0" eaLnBrk="1" latinLnBrk="0" hangingPunct="1">
+      <a:defRPr sz="1200" kern="1200">
+        <a:solidFill>
+          <a:schemeClr val="tx1"/>
+        </a:solidFill>
+        <a:latin typeface="+mn-lt"/>
+        <a:ea typeface="+mn-ea"/>
+        <a:cs typeface="+mn-cs"/>
+      </a:defRPr>
+    </a:lvl7pPr>
+    <a:lvl8pPr marL="3200400" algn="l" defTabSz="914400" rtl="0" eaLnBrk="1" latinLnBrk="0" hangingPunct="1">
+      <a:defRPr sz="1200" kern="1200">
+        <a:solidFill>
+          <a:schemeClr val="tx1"/>
+        </a:solidFill>
+        <a:latin typeface="+mn-lt"/>
+        <a:ea typeface="+mn-ea"/>
+        <a:cs typeface="+mn-cs"/>
+      </a:defRPr>
+    </a:lvl8pPr>
+    <a:lvl9pPr marL="3657600" algn="l" defTabSz="914400" rtl="0" eaLnBrk="1" latinLnBrk="0" hangingPunct="1">
+      <a:defRPr sz="1200" kern="1200">
+        <a:solidFill>
+          <a:schemeClr val="tx1"/>
+        </a:solidFill>
+        <a:latin typeface="+mn-lt"/>
+        <a:ea typeface="+mn-ea"/>
+        <a:cs typeface="+mn-cs"/>
+      </a:defRPr>
+    </a:lvl9pPr>
+  </p:notesStyle>
+</p:notesMaster>
+</file>
+
+<file path=ppt/notesSlides/notesSlide1.xml><?xml version="1.0" encoding="utf-8"?>
+<p:notes xmlns:a="http://schemas.openxmlformats.org/drawingml/2006/main" xmlns:r="http://schemas.openxmlformats.org/officeDocument/2006/relationships" xmlns:p="http://schemas.openxmlformats.org/presentationml/2006/main">
+  <p:cSld>
+    <p:spTree>
+      <p:nvGrpSpPr>
+        <p:cNvPr id="1" name=""/>
+        <p:cNvGrpSpPr/>
+        <p:nvPr/>
+      </p:nvGrpSpPr>
+      <p:grpSpPr>
+        <a:xfrm>
+          <a:off x="0" y="0"/>
+          <a:ext cx="0" cy="0"/>
+          <a:chOff x="0" y="0"/>
+          <a:chExt cx="0" cy="0"/>
+        </a:xfrm>
+      </p:grpSpPr>
+      <p:sp>
+        <p:nvSpPr>
+          <p:cNvPr id="2" name="Marcador de imagen de diapositiva 1"/>
+          <p:cNvSpPr>
+            <a:spLocks noGrp="1" noRot="1" noChangeAspect="1"/>
+          </p:cNvSpPr>
+          <p:nvPr>
+            <p:ph type="sldImg"/>
+          </p:nvPr>
+        </p:nvSpPr>
+        <p:spPr/>
+      </p:sp>
+      <p:sp>
+        <p:nvSpPr>
+          <p:cNvPr id="3" name="Marcador de notas 2"/>
+          <p:cNvSpPr>
+            <a:spLocks noGrp="1"/>
+          </p:cNvSpPr>
+          <p:nvPr>
+            <p:ph type="body" idx="1"/>
+          </p:nvPr>
+        </p:nvSpPr>
+        <p:spPr/>
+        <p:txBody>
+          <a:bodyPr/>
+          <a:lstStyle/>
+          <a:p>
+            <a:r>
+              <a:rPr lang="en-US" dirty="0"/>
+              <a:t>Our research was based on the question of whether there is a relationship between the inflation rates and the amount of crime. </a:t>
+            </a:r>
+          </a:p>
+          <a:p>
+            <a:r>
+              <a:rPr lang="en-US" dirty="0"/>
+              <a:t>Our intuition tells us that, normally, money is a major motivator for crime. </a:t>
+            </a:r>
+          </a:p>
+          <a:p>
+            <a:r>
+              <a:rPr lang="en-US" dirty="0"/>
+              <a:t>Therefore, we might be biased, but we kept our research as focused as possible. But due to the nature of the data, the samples are limited, as not every country reports the statistics, and the countries that do, not all of them are completely  trustable. </a:t>
+            </a:r>
+          </a:p>
+          <a:p>
+            <a:r>
+              <a:rPr lang="en-US" dirty="0"/>
+              <a:t>Therefore, our research will be completely focused on the US, as the US has extensive reports on crime. </a:t>
+            </a:r>
+          </a:p>
+          <a:p>
+            <a:r>
+              <a:rPr lang="en-US" dirty="0"/>
+              <a:t>But this will only make the research valid on the US, as crime is also tied to culture, local laws, among others. </a:t>
+            </a:r>
+          </a:p>
+          <a:p>
+            <a:r>
+              <a:rPr lang="en-US" dirty="0"/>
+              <a:t>So our research is not as extensive as we would like it to be. </a:t>
+            </a:r>
+          </a:p>
+        </p:txBody>
+      </p:sp>
+      <p:sp>
+        <p:nvSpPr>
+          <p:cNvPr id="4" name="Marcador de número de diapositiva 3"/>
+          <p:cNvSpPr>
+            <a:spLocks noGrp="1"/>
+          </p:cNvSpPr>
+          <p:nvPr>
+            <p:ph type="sldNum" sz="quarter" idx="5"/>
+          </p:nvPr>
+        </p:nvSpPr>
+        <p:spPr/>
+        <p:txBody>
+          <a:bodyPr/>
+          <a:lstStyle/>
+          <a:p>
+            <a:fld id="{B1B86416-57AC-4DAC-BB64-521FF3D998C4}" type="slidenum">
+              <a:rPr lang="es-MX" smtClean="0"/>
+              <a:t>2</a:t>
+            </a:fld>
+            <a:endParaRPr lang="es-MX"/>
+          </a:p>
+        </p:txBody>
+      </p:sp>
+    </p:spTree>
+    <p:extLst>
+      <p:ext uri="{BB962C8B-B14F-4D97-AF65-F5344CB8AC3E}">
+        <p14:creationId xmlns:p14="http://schemas.microsoft.com/office/powerpoint/2010/main" val="1327174152"/>
+      </p:ext>
+    </p:extLst>
+  </p:cSld>
+  <p:clrMapOvr>
+    <a:masterClrMapping/>
+  </p:clrMapOvr>
+</p:notes>
+</file>
+
+<file path=ppt/notesSlides/notesSlide2.xml><?xml version="1.0" encoding="utf-8"?>
+<p:notes xmlns:a="http://schemas.openxmlformats.org/drawingml/2006/main" xmlns:r="http://schemas.openxmlformats.org/officeDocument/2006/relationships" xmlns:p="http://schemas.openxmlformats.org/presentationml/2006/main">
+  <p:cSld>
+    <p:spTree>
+      <p:nvGrpSpPr>
+        <p:cNvPr id="1" name=""/>
+        <p:cNvGrpSpPr/>
+        <p:nvPr/>
+      </p:nvGrpSpPr>
+      <p:grpSpPr>
+        <a:xfrm>
+          <a:off x="0" y="0"/>
+          <a:ext cx="0" cy="0"/>
+          <a:chOff x="0" y="0"/>
+          <a:chExt cx="0" cy="0"/>
+        </a:xfrm>
+      </p:grpSpPr>
+      <p:sp>
+        <p:nvSpPr>
+          <p:cNvPr id="2" name="Marcador de imagen de diapositiva 1"/>
+          <p:cNvSpPr>
+            <a:spLocks noGrp="1" noRot="1" noChangeAspect="1"/>
+          </p:cNvSpPr>
+          <p:nvPr>
+            <p:ph type="sldImg"/>
+          </p:nvPr>
+        </p:nvSpPr>
+        <p:spPr/>
+      </p:sp>
+      <p:sp>
+        <p:nvSpPr>
+          <p:cNvPr id="3" name="Marcador de notas 2"/>
+          <p:cNvSpPr>
+            <a:spLocks noGrp="1"/>
+          </p:cNvSpPr>
+          <p:nvPr>
+            <p:ph type="body" idx="1"/>
+          </p:nvPr>
+        </p:nvSpPr>
+        <p:spPr/>
+        <p:txBody>
+          <a:bodyPr/>
+          <a:lstStyle/>
+          <a:p>
+            <a:r>
+              <a:rPr lang="en-US" dirty="0"/>
+              <a:t>We used two datasets: The St. Louis Federal Reserve for the inflation rates, and the FBI Uniform Crime Reporting dataset for the crime statistics. </a:t>
+            </a:r>
+          </a:p>
+          <a:p>
+            <a:r>
+              <a:rPr lang="en-US" dirty="0"/>
+              <a:t>However, the FBI dataset was split across every year, so we used </a:t>
+            </a:r>
+            <a:r>
+              <a:rPr lang="en-US" dirty="0" err="1"/>
+              <a:t>DisasterCenter</a:t>
+            </a:r>
+            <a:r>
+              <a:rPr lang="en-US" dirty="0"/>
+              <a:t>, which has the same data, but in a single dataset. </a:t>
+            </a:r>
+          </a:p>
+        </p:txBody>
+      </p:sp>
+      <p:sp>
+        <p:nvSpPr>
+          <p:cNvPr id="4" name="Marcador de número de diapositiva 3"/>
+          <p:cNvSpPr>
+            <a:spLocks noGrp="1"/>
+          </p:cNvSpPr>
+          <p:nvPr>
+            <p:ph type="sldNum" sz="quarter" idx="5"/>
+          </p:nvPr>
+        </p:nvSpPr>
+        <p:spPr/>
+        <p:txBody>
+          <a:bodyPr/>
+          <a:lstStyle/>
+          <a:p>
+            <a:fld id="{B1B86416-57AC-4DAC-BB64-521FF3D998C4}" type="slidenum">
+              <a:rPr lang="es-MX" smtClean="0"/>
+              <a:t>3</a:t>
+            </a:fld>
+            <a:endParaRPr lang="es-MX"/>
+          </a:p>
+        </p:txBody>
+      </p:sp>
+    </p:spTree>
+    <p:extLst>
+      <p:ext uri="{BB962C8B-B14F-4D97-AF65-F5344CB8AC3E}">
+        <p14:creationId xmlns:p14="http://schemas.microsoft.com/office/powerpoint/2010/main" val="3006064019"/>
+      </p:ext>
+    </p:extLst>
+  </p:cSld>
+  <p:clrMapOvr>
+    <a:masterClrMapping/>
+  </p:clrMapOvr>
+</p:notes>
+</file>
+
+<file path=ppt/notesSlides/notesSlide3.xml><?xml version="1.0" encoding="utf-8"?>
+<p:notes xmlns:a="http://schemas.openxmlformats.org/drawingml/2006/main" xmlns:r="http://schemas.openxmlformats.org/officeDocument/2006/relationships" xmlns:p="http://schemas.openxmlformats.org/presentationml/2006/main">
+  <p:cSld>
+    <p:spTree>
+      <p:nvGrpSpPr>
+        <p:cNvPr id="1" name=""/>
+        <p:cNvGrpSpPr/>
+        <p:nvPr/>
+      </p:nvGrpSpPr>
+      <p:grpSpPr>
+        <a:xfrm>
+          <a:off x="0" y="0"/>
+          <a:ext cx="0" cy="0"/>
+          <a:chOff x="0" y="0"/>
+          <a:chExt cx="0" cy="0"/>
+        </a:xfrm>
+      </p:grpSpPr>
+      <p:sp>
+        <p:nvSpPr>
+          <p:cNvPr id="2" name="Marcador de imagen de diapositiva 1"/>
+          <p:cNvSpPr>
+            <a:spLocks noGrp="1" noRot="1" noChangeAspect="1"/>
+          </p:cNvSpPr>
+          <p:nvPr>
+            <p:ph type="sldImg"/>
+          </p:nvPr>
+        </p:nvSpPr>
+        <p:spPr/>
+      </p:sp>
+      <p:sp>
+        <p:nvSpPr>
+          <p:cNvPr id="3" name="Marcador de notas 2"/>
+          <p:cNvSpPr>
+            <a:spLocks noGrp="1"/>
+          </p:cNvSpPr>
+          <p:nvPr>
+            <p:ph type="body" idx="1"/>
+          </p:nvPr>
+        </p:nvSpPr>
+        <p:spPr/>
+        <p:txBody>
+          <a:bodyPr/>
+          <a:lstStyle/>
+          <a:p>
+            <a:r>
+              <a:rPr lang="en-US" noProof="0" dirty="0"/>
+              <a:t>Removal of outliers: </a:t>
+            </a:r>
+          </a:p>
+          <a:p>
+            <a:r>
+              <a:rPr lang="en-US" noProof="0" dirty="0"/>
+              <a:t>Removing outliers is a common practice, and the standard is that any data that is outside 3 standard deviations is considered an outlier. In this case, 5 out of 60 values were removed. </a:t>
+            </a:r>
+          </a:p>
+          <a:p>
+            <a:endParaRPr lang="en-US" noProof="0" dirty="0"/>
+          </a:p>
+          <a:p>
+            <a:r>
+              <a:rPr lang="en-US" noProof="0" dirty="0" err="1"/>
+              <a:t>Formating</a:t>
+            </a:r>
+            <a:r>
+              <a:rPr lang="en-US" noProof="0" dirty="0"/>
+              <a:t> dates: </a:t>
+            </a:r>
+          </a:p>
+          <a:p>
+            <a:r>
+              <a:rPr lang="en-US" noProof="0" dirty="0"/>
+              <a:t>The data had to be reformatted, as the date in the original dataset was a string, so it had to be reconverted to Date, and then to numeric so we could use it to filter by year easily. </a:t>
+            </a:r>
+          </a:p>
+          <a:p>
+            <a:endParaRPr lang="en-US" noProof="0" dirty="0"/>
+          </a:p>
+          <a:p>
+            <a:endParaRPr lang="en-US" noProof="0" dirty="0"/>
+          </a:p>
+        </p:txBody>
+      </p:sp>
+      <p:sp>
+        <p:nvSpPr>
+          <p:cNvPr id="4" name="Marcador de número de diapositiva 3"/>
+          <p:cNvSpPr>
+            <a:spLocks noGrp="1"/>
+          </p:cNvSpPr>
+          <p:nvPr>
+            <p:ph type="sldNum" sz="quarter" idx="5"/>
+          </p:nvPr>
+        </p:nvSpPr>
+        <p:spPr/>
+        <p:txBody>
+          <a:bodyPr/>
+          <a:lstStyle/>
+          <a:p>
+            <a:fld id="{B1B86416-57AC-4DAC-BB64-521FF3D998C4}" type="slidenum">
+              <a:rPr lang="es-MX" smtClean="0"/>
+              <a:t>4</a:t>
+            </a:fld>
+            <a:endParaRPr lang="es-MX"/>
+          </a:p>
+        </p:txBody>
+      </p:sp>
+    </p:spTree>
+    <p:extLst>
+      <p:ext uri="{BB962C8B-B14F-4D97-AF65-F5344CB8AC3E}">
+        <p14:creationId xmlns:p14="http://schemas.microsoft.com/office/powerpoint/2010/main" val="3250478800"/>
+      </p:ext>
+    </p:extLst>
+  </p:cSld>
+  <p:clrMapOvr>
+    <a:masterClrMapping/>
+  </p:clrMapOvr>
+</p:notes>
+</file>
+
+<file path=ppt/notesSlides/notesSlide4.xml><?xml version="1.0" encoding="utf-8"?>
+<p:notes xmlns:a="http://schemas.openxmlformats.org/drawingml/2006/main" xmlns:r="http://schemas.openxmlformats.org/officeDocument/2006/relationships" xmlns:p="http://schemas.openxmlformats.org/presentationml/2006/main">
+  <p:cSld>
+    <p:spTree>
+      <p:nvGrpSpPr>
+        <p:cNvPr id="1" name=""/>
+        <p:cNvGrpSpPr/>
+        <p:nvPr/>
+      </p:nvGrpSpPr>
+      <p:grpSpPr>
+        <a:xfrm>
+          <a:off x="0" y="0"/>
+          <a:ext cx="0" cy="0"/>
+          <a:chOff x="0" y="0"/>
+          <a:chExt cx="0" cy="0"/>
+        </a:xfrm>
+      </p:grpSpPr>
+      <p:sp>
+        <p:nvSpPr>
+          <p:cNvPr id="2" name="Marcador de imagen de diapositiva 1"/>
+          <p:cNvSpPr>
+            <a:spLocks noGrp="1" noRot="1" noChangeAspect="1"/>
+          </p:cNvSpPr>
+          <p:nvPr>
+            <p:ph type="sldImg"/>
+          </p:nvPr>
+        </p:nvSpPr>
+        <p:spPr/>
+      </p:sp>
+      <p:sp>
+        <p:nvSpPr>
+          <p:cNvPr id="3" name="Marcador de notas 2"/>
+          <p:cNvSpPr>
+            <a:spLocks noGrp="1"/>
+          </p:cNvSpPr>
+          <p:nvPr>
+            <p:ph type="body" idx="1"/>
+          </p:nvPr>
+        </p:nvSpPr>
+        <p:spPr/>
+        <p:txBody>
+          <a:bodyPr/>
+          <a:lstStyle/>
+          <a:p>
+            <a:r>
+              <a:rPr lang="en-US" noProof="0" dirty="0"/>
+              <a:t>Some basic comparisons were made to see the behavior of different types of crimes next to the behavior of the CPI over the years. </a:t>
+            </a:r>
+          </a:p>
+          <a:p>
+            <a:r>
+              <a:rPr lang="en-US" u="none" noProof="0" dirty="0"/>
+              <a:t>Most of the graphics behaved very similarly, showing a stark increase following the increase in CPI, and then, a steady decrease, but with a delay. Their shape also resembles a normal distribution. </a:t>
+            </a:r>
+          </a:p>
+        </p:txBody>
+      </p:sp>
+      <p:sp>
+        <p:nvSpPr>
+          <p:cNvPr id="4" name="Marcador de número de diapositiva 3"/>
+          <p:cNvSpPr>
+            <a:spLocks noGrp="1"/>
+          </p:cNvSpPr>
+          <p:nvPr>
+            <p:ph type="sldNum" sz="quarter" idx="5"/>
+          </p:nvPr>
+        </p:nvSpPr>
+        <p:spPr/>
+        <p:txBody>
+          <a:bodyPr/>
+          <a:lstStyle/>
+          <a:p>
+            <a:fld id="{B1B86416-57AC-4DAC-BB64-521FF3D998C4}" type="slidenum">
+              <a:rPr lang="es-MX" smtClean="0"/>
+              <a:t>5</a:t>
+            </a:fld>
+            <a:endParaRPr lang="es-MX"/>
+          </a:p>
+        </p:txBody>
+      </p:sp>
+    </p:spTree>
+    <p:extLst>
+      <p:ext uri="{BB962C8B-B14F-4D97-AF65-F5344CB8AC3E}">
+        <p14:creationId xmlns:p14="http://schemas.microsoft.com/office/powerpoint/2010/main" val="1102898719"/>
+      </p:ext>
+    </p:extLst>
+  </p:cSld>
+  <p:clrMapOvr>
+    <a:masterClrMapping/>
+  </p:clrMapOvr>
+</p:notes>
+</file>
+
+<file path=ppt/notesSlides/notesSlide5.xml><?xml version="1.0" encoding="utf-8"?>
+<p:notes xmlns:a="http://schemas.openxmlformats.org/drawingml/2006/main" xmlns:r="http://schemas.openxmlformats.org/officeDocument/2006/relationships" xmlns:p="http://schemas.openxmlformats.org/presentationml/2006/main">
+  <p:cSld>
+    <p:spTree>
+      <p:nvGrpSpPr>
+        <p:cNvPr id="1" name=""/>
+        <p:cNvGrpSpPr/>
+        <p:nvPr/>
+      </p:nvGrpSpPr>
+      <p:grpSpPr>
+        <a:xfrm>
+          <a:off x="0" y="0"/>
+          <a:ext cx="0" cy="0"/>
+          <a:chOff x="0" y="0"/>
+          <a:chExt cx="0" cy="0"/>
+        </a:xfrm>
+      </p:grpSpPr>
+      <p:sp>
+        <p:nvSpPr>
+          <p:cNvPr id="2" name="Marcador de imagen de diapositiva 1"/>
+          <p:cNvSpPr>
+            <a:spLocks noGrp="1" noRot="1" noChangeAspect="1"/>
+          </p:cNvSpPr>
+          <p:nvPr>
+            <p:ph type="sldImg"/>
+          </p:nvPr>
+        </p:nvSpPr>
+        <p:spPr/>
+      </p:sp>
+      <p:sp>
+        <p:nvSpPr>
+          <p:cNvPr id="3" name="Marcador de notas 2"/>
+          <p:cNvSpPr>
+            <a:spLocks noGrp="1"/>
+          </p:cNvSpPr>
+          <p:nvPr>
+            <p:ph type="body" idx="1"/>
+          </p:nvPr>
+        </p:nvSpPr>
+        <p:spPr/>
+        <p:txBody>
+          <a:bodyPr/>
+          <a:lstStyle/>
+          <a:p>
+            <a:r>
+              <a:rPr lang="en-US" dirty="0"/>
+              <a:t>After adjusting the crime statistics per 100,000 pop we can see that the behavior stays the same, as only the scale was adjusted, but the general behavior stays the same. </a:t>
+            </a:r>
+          </a:p>
+          <a:p>
+            <a:r>
+              <a:rPr lang="en-US" dirty="0"/>
+              <a:t>Therefore, we can use the adjusted data for our following tests and methods. </a:t>
+            </a:r>
+          </a:p>
+        </p:txBody>
+      </p:sp>
+      <p:sp>
+        <p:nvSpPr>
+          <p:cNvPr id="4" name="Marcador de número de diapositiva 3"/>
+          <p:cNvSpPr>
+            <a:spLocks noGrp="1"/>
+          </p:cNvSpPr>
+          <p:nvPr>
+            <p:ph type="sldNum" sz="quarter" idx="5"/>
+          </p:nvPr>
+        </p:nvSpPr>
+        <p:spPr/>
+        <p:txBody>
+          <a:bodyPr/>
+          <a:lstStyle/>
+          <a:p>
+            <a:fld id="{B1B86416-57AC-4DAC-BB64-521FF3D998C4}" type="slidenum">
+              <a:rPr lang="es-MX" smtClean="0"/>
+              <a:t>6</a:t>
+            </a:fld>
+            <a:endParaRPr lang="es-MX"/>
+          </a:p>
+        </p:txBody>
+      </p:sp>
+    </p:spTree>
+    <p:extLst>
+      <p:ext uri="{BB962C8B-B14F-4D97-AF65-F5344CB8AC3E}">
+        <p14:creationId xmlns:p14="http://schemas.microsoft.com/office/powerpoint/2010/main" val="2882531998"/>
+      </p:ext>
+    </p:extLst>
+  </p:cSld>
+  <p:clrMapOvr>
+    <a:masterClrMapping/>
+  </p:clrMapOvr>
+</p:notes>
+</file>
+
+<file path=ppt/notesSlides/notesSlide6.xml><?xml version="1.0" encoding="utf-8"?>
+<p:notes xmlns:a="http://schemas.openxmlformats.org/drawingml/2006/main" xmlns:r="http://schemas.openxmlformats.org/officeDocument/2006/relationships" xmlns:p="http://schemas.openxmlformats.org/presentationml/2006/main">
+  <p:cSld>
+    <p:spTree>
+      <p:nvGrpSpPr>
+        <p:cNvPr id="1" name=""/>
+        <p:cNvGrpSpPr/>
+        <p:nvPr/>
+      </p:nvGrpSpPr>
+      <p:grpSpPr>
+        <a:xfrm>
+          <a:off x="0" y="0"/>
+          <a:ext cx="0" cy="0"/>
+          <a:chOff x="0" y="0"/>
+          <a:chExt cx="0" cy="0"/>
+        </a:xfrm>
+      </p:grpSpPr>
+      <p:sp>
+        <p:nvSpPr>
+          <p:cNvPr id="2" name="Marcador de imagen de diapositiva 1"/>
+          <p:cNvSpPr>
+            <a:spLocks noGrp="1" noRot="1" noChangeAspect="1"/>
+          </p:cNvSpPr>
+          <p:nvPr>
+            <p:ph type="sldImg"/>
+          </p:nvPr>
+        </p:nvSpPr>
+        <p:spPr/>
+      </p:sp>
+      <p:sp>
+        <p:nvSpPr>
+          <p:cNvPr id="3" name="Marcador de notas 2"/>
+          <p:cNvSpPr>
+            <a:spLocks noGrp="1"/>
+          </p:cNvSpPr>
+          <p:nvPr>
+            <p:ph type="body" idx="1"/>
+          </p:nvPr>
+        </p:nvSpPr>
+        <p:spPr/>
+        <p:txBody>
+          <a:bodyPr/>
+          <a:lstStyle/>
+          <a:p>
+            <a:r>
+              <a:rPr lang="en-US" dirty="0"/>
+              <a:t>As we can see in this plot, there is a relation between the percentage of crime, which is the percentage of the total number of crimes per the entire population, and the inflation rate. </a:t>
+            </a:r>
+          </a:p>
+          <a:p>
+            <a:r>
+              <a:rPr lang="en-US" dirty="0"/>
+              <a:t>However, this relation is not completely clear, and we will require further tests and analysis to determine what, if any , the relation is. </a:t>
+            </a:r>
+          </a:p>
+        </p:txBody>
+      </p:sp>
+      <p:sp>
+        <p:nvSpPr>
+          <p:cNvPr id="4" name="Marcador de número de diapositiva 3"/>
+          <p:cNvSpPr>
+            <a:spLocks noGrp="1"/>
+          </p:cNvSpPr>
+          <p:nvPr>
+            <p:ph type="sldNum" sz="quarter" idx="5"/>
+          </p:nvPr>
+        </p:nvSpPr>
+        <p:spPr/>
+        <p:txBody>
+          <a:bodyPr/>
+          <a:lstStyle/>
+          <a:p>
+            <a:fld id="{B1B86416-57AC-4DAC-BB64-521FF3D998C4}" type="slidenum">
+              <a:rPr lang="es-MX" smtClean="0"/>
+              <a:t>7</a:t>
+            </a:fld>
+            <a:endParaRPr lang="es-MX"/>
+          </a:p>
+        </p:txBody>
+      </p:sp>
+    </p:spTree>
+    <p:extLst>
+      <p:ext uri="{BB962C8B-B14F-4D97-AF65-F5344CB8AC3E}">
+        <p14:creationId xmlns:p14="http://schemas.microsoft.com/office/powerpoint/2010/main" val="1796089488"/>
+      </p:ext>
+    </p:extLst>
+  </p:cSld>
+  <p:clrMapOvr>
+    <a:masterClrMapping/>
+  </p:clrMapOvr>
+</p:notes>
+</file>
+
+<file path=ppt/notesSlides/notesSlide7.xml><?xml version="1.0" encoding="utf-8"?>
+<p:notes xmlns:a="http://schemas.openxmlformats.org/drawingml/2006/main" xmlns:r="http://schemas.openxmlformats.org/officeDocument/2006/relationships" xmlns:p="http://schemas.openxmlformats.org/presentationml/2006/main">
+  <p:cSld>
+    <p:spTree>
+      <p:nvGrpSpPr>
+        <p:cNvPr id="1" name=""/>
+        <p:cNvGrpSpPr/>
+        <p:nvPr/>
+      </p:nvGrpSpPr>
+      <p:grpSpPr>
+        <a:xfrm>
+          <a:off x="0" y="0"/>
+          <a:ext cx="0" cy="0"/>
+          <a:chOff x="0" y="0"/>
+          <a:chExt cx="0" cy="0"/>
+        </a:xfrm>
+      </p:grpSpPr>
+      <p:sp>
+        <p:nvSpPr>
+          <p:cNvPr id="2" name="Marcador de imagen de diapositiva 1"/>
+          <p:cNvSpPr>
+            <a:spLocks noGrp="1" noRot="1" noChangeAspect="1"/>
+          </p:cNvSpPr>
+          <p:nvPr>
+            <p:ph type="sldImg"/>
+          </p:nvPr>
+        </p:nvSpPr>
+        <p:spPr/>
+      </p:sp>
+      <p:sp>
+        <p:nvSpPr>
+          <p:cNvPr id="3" name="Marcador de notas 2"/>
+          <p:cNvSpPr>
+            <a:spLocks noGrp="1"/>
+          </p:cNvSpPr>
+          <p:nvPr>
+            <p:ph type="body" idx="1"/>
+          </p:nvPr>
+        </p:nvSpPr>
+        <p:spPr/>
+        <p:txBody>
+          <a:bodyPr/>
+          <a:lstStyle/>
+          <a:p>
+            <a:r>
+              <a:rPr lang="en-US" dirty="0"/>
+              <a:t>The correlation tests are done to evaluate the association between two or more variables or samples. </a:t>
+            </a:r>
+          </a:p>
+          <a:p>
+            <a:r>
+              <a:rPr lang="en-US" dirty="0"/>
+              <a:t>In this case, we performed this test for the inflation rate against every crime type, to see how they were related. </a:t>
+            </a:r>
+          </a:p>
+          <a:p>
+            <a:r>
+              <a:rPr lang="en-US" dirty="0"/>
+              <a:t>R uses the Pearson test as a default, which is the one we used. </a:t>
+            </a:r>
+          </a:p>
+          <a:p>
+            <a:r>
+              <a:rPr lang="en-US" dirty="0"/>
+              <a:t>In the Pearson test, there are 3 possible results: </a:t>
+            </a:r>
+          </a:p>
+          <a:p>
+            <a:r>
+              <a:rPr lang="en-US" dirty="0"/>
+              <a:t>Values between -1 and 0, 0, and values between 0 and 1.</a:t>
+            </a:r>
+          </a:p>
+          <a:p>
+            <a:r>
+              <a:rPr lang="en-US" dirty="0"/>
+              <a:t>Values between -1 and 0 mean that the relation is negative: The more one value increases, the more the other decreases. </a:t>
+            </a:r>
+          </a:p>
+          <a:p>
+            <a:r>
+              <a:rPr lang="en-US" dirty="0"/>
+              <a:t>0 means that there is no correlation at all. </a:t>
+            </a:r>
+          </a:p>
+          <a:p>
+            <a:r>
+              <a:rPr lang="en-US" dirty="0"/>
+              <a:t>Values between 1 and 0 means that the relation is positive: the more one value increases, so does the other. </a:t>
+            </a:r>
+          </a:p>
+          <a:p>
+            <a:endParaRPr lang="en-US" dirty="0"/>
+          </a:p>
+        </p:txBody>
+      </p:sp>
+      <p:sp>
+        <p:nvSpPr>
+          <p:cNvPr id="4" name="Marcador de número de diapositiva 3"/>
+          <p:cNvSpPr>
+            <a:spLocks noGrp="1"/>
+          </p:cNvSpPr>
+          <p:nvPr>
+            <p:ph type="sldNum" sz="quarter" idx="5"/>
+          </p:nvPr>
+        </p:nvSpPr>
+        <p:spPr/>
+        <p:txBody>
+          <a:bodyPr/>
+          <a:lstStyle/>
+          <a:p>
+            <a:fld id="{B1B86416-57AC-4DAC-BB64-521FF3D998C4}" type="slidenum">
+              <a:rPr lang="es-MX" smtClean="0"/>
+              <a:t>8</a:t>
+            </a:fld>
+            <a:endParaRPr lang="es-MX"/>
+          </a:p>
+        </p:txBody>
+      </p:sp>
+    </p:spTree>
+    <p:extLst>
+      <p:ext uri="{BB962C8B-B14F-4D97-AF65-F5344CB8AC3E}">
+        <p14:creationId xmlns:p14="http://schemas.microsoft.com/office/powerpoint/2010/main" val="3525263507"/>
+      </p:ext>
+    </p:extLst>
+  </p:cSld>
+  <p:clrMapOvr>
+    <a:masterClrMapping/>
+  </p:clrMapOvr>
+</p:notes>
+</file>
+
+<file path=ppt/notesSlides/notesSlide8.xml><?xml version="1.0" encoding="utf-8"?>
+<p:notes xmlns:a="http://schemas.openxmlformats.org/drawingml/2006/main" xmlns:r="http://schemas.openxmlformats.org/officeDocument/2006/relationships" xmlns:p="http://schemas.openxmlformats.org/presentationml/2006/main">
+  <p:cSld>
+    <p:spTree>
+      <p:nvGrpSpPr>
+        <p:cNvPr id="1" name=""/>
+        <p:cNvGrpSpPr/>
+        <p:nvPr/>
+      </p:nvGrpSpPr>
+      <p:grpSpPr>
+        <a:xfrm>
+          <a:off x="0" y="0"/>
+          <a:ext cx="0" cy="0"/>
+          <a:chOff x="0" y="0"/>
+          <a:chExt cx="0" cy="0"/>
+        </a:xfrm>
+      </p:grpSpPr>
+      <p:sp>
+        <p:nvSpPr>
+          <p:cNvPr id="2" name="Marcador de imagen de diapositiva 1"/>
+          <p:cNvSpPr>
+            <a:spLocks noGrp="1" noRot="1" noChangeAspect="1"/>
+          </p:cNvSpPr>
+          <p:nvPr>
+            <p:ph type="sldImg"/>
+          </p:nvPr>
+        </p:nvSpPr>
+        <p:spPr/>
+      </p:sp>
+      <p:sp>
+        <p:nvSpPr>
+          <p:cNvPr id="3" name="Marcador de notas 2"/>
+          <p:cNvSpPr>
+            <a:spLocks noGrp="1"/>
+          </p:cNvSpPr>
+          <p:nvPr>
+            <p:ph type="body" idx="1"/>
+          </p:nvPr>
+        </p:nvSpPr>
+        <p:spPr/>
+        <p:txBody>
+          <a:bodyPr/>
+          <a:lstStyle/>
+          <a:p>
+            <a:r>
+              <a:rPr lang="en-US" dirty="0"/>
+              <a:t>As we can see, for some of the crimes, the correlation is lower than 0.5, which means that although there is a degree of relation, it is too low.</a:t>
+            </a:r>
+          </a:p>
+        </p:txBody>
+      </p:sp>
+      <p:sp>
+        <p:nvSpPr>
+          <p:cNvPr id="4" name="Marcador de número de diapositiva 3"/>
+          <p:cNvSpPr>
+            <a:spLocks noGrp="1"/>
+          </p:cNvSpPr>
+          <p:nvPr>
+            <p:ph type="sldNum" sz="quarter" idx="5"/>
+          </p:nvPr>
+        </p:nvSpPr>
+        <p:spPr/>
+        <p:txBody>
+          <a:bodyPr/>
+          <a:lstStyle/>
+          <a:p>
+            <a:fld id="{B1B86416-57AC-4DAC-BB64-521FF3D998C4}" type="slidenum">
+              <a:rPr lang="es-MX" smtClean="0"/>
+              <a:t>9</a:t>
+            </a:fld>
+            <a:endParaRPr lang="es-MX"/>
+          </a:p>
+        </p:txBody>
+      </p:sp>
+    </p:spTree>
+    <p:extLst>
+      <p:ext uri="{BB962C8B-B14F-4D97-AF65-F5344CB8AC3E}">
+        <p14:creationId xmlns:p14="http://schemas.microsoft.com/office/powerpoint/2010/main" val="290721380"/>
+      </p:ext>
+    </p:extLst>
+  </p:cSld>
+  <p:clrMapOvr>
+    <a:masterClrMapping/>
+  </p:clrMapOvr>
+</p:notes>
+</file>
+
+<file path=ppt/notesSlides/notesSlide9.xml><?xml version="1.0" encoding="utf-8"?>
+<p:notes xmlns:a="http://schemas.openxmlformats.org/drawingml/2006/main" xmlns:r="http://schemas.openxmlformats.org/officeDocument/2006/relationships" xmlns:p="http://schemas.openxmlformats.org/presentationml/2006/main">
+  <p:cSld>
+    <p:spTree>
+      <p:nvGrpSpPr>
+        <p:cNvPr id="1" name=""/>
+        <p:cNvGrpSpPr/>
+        <p:nvPr/>
+      </p:nvGrpSpPr>
+      <p:grpSpPr>
+        <a:xfrm>
+          <a:off x="0" y="0"/>
+          <a:ext cx="0" cy="0"/>
+          <a:chOff x="0" y="0"/>
+          <a:chExt cx="0" cy="0"/>
+        </a:xfrm>
+      </p:grpSpPr>
+      <p:sp>
+        <p:nvSpPr>
+          <p:cNvPr id="2" name="Marcador de imagen de diapositiva 1"/>
+          <p:cNvSpPr>
+            <a:spLocks noGrp="1" noRot="1" noChangeAspect="1"/>
+          </p:cNvSpPr>
+          <p:nvPr>
+            <p:ph type="sldImg"/>
+          </p:nvPr>
+        </p:nvSpPr>
+        <p:spPr/>
+      </p:sp>
+      <p:sp>
+        <p:nvSpPr>
+          <p:cNvPr id="3" name="Marcador de notas 2"/>
+          <p:cNvSpPr>
+            <a:spLocks noGrp="1"/>
+          </p:cNvSpPr>
+          <p:nvPr>
+            <p:ph type="body" idx="1"/>
+          </p:nvPr>
+        </p:nvSpPr>
+        <p:spPr/>
+        <p:txBody>
+          <a:bodyPr/>
+          <a:lstStyle/>
+          <a:p>
+            <a:r>
+              <a:rPr lang="en-US" dirty="0"/>
+              <a:t>However, for others, once we used the crimes per 100,000 dataset, we saw that come had a strong correlation. </a:t>
+            </a:r>
+          </a:p>
+        </p:txBody>
+      </p:sp>
+      <p:sp>
+        <p:nvSpPr>
+          <p:cNvPr id="4" name="Marcador de número de diapositiva 3"/>
+          <p:cNvSpPr>
+            <a:spLocks noGrp="1"/>
+          </p:cNvSpPr>
+          <p:nvPr>
+            <p:ph type="sldNum" sz="quarter" idx="5"/>
+          </p:nvPr>
+        </p:nvSpPr>
+        <p:spPr/>
+        <p:txBody>
+          <a:bodyPr/>
+          <a:lstStyle/>
+          <a:p>
+            <a:fld id="{B1B86416-57AC-4DAC-BB64-521FF3D998C4}" type="slidenum">
+              <a:rPr lang="es-MX" smtClean="0"/>
+              <a:t>10</a:t>
+            </a:fld>
+            <a:endParaRPr lang="es-MX"/>
+          </a:p>
+        </p:txBody>
+      </p:sp>
+    </p:spTree>
+    <p:extLst>
+      <p:ext uri="{BB962C8B-B14F-4D97-AF65-F5344CB8AC3E}">
+        <p14:creationId xmlns:p14="http://schemas.microsoft.com/office/powerpoint/2010/main" val="597454418"/>
+      </p:ext>
+    </p:extLst>
+  </p:cSld>
+  <p:clrMapOvr>
+    <a:masterClrMapping/>
+  </p:clrMapOvr>
+</p:notes>
 </file>
 
 <file path=ppt/slideLayouts/slideLayout1.xml><?xml version="1.0" encoding="utf-8"?>
@@ -394,7 +1912,7 @@
             <a:fld id="{0D309695-DEC3-40DA-9DF5-330280C9D0E8}" type="slidenum">
               <a:rPr lang="en-US" smtClean="0"/>
               <a:pPr/>
-              <a:t>‹#›</a:t>
+              <a:t>‹Nº›</a:t>
             </a:fld>
             <a:endParaRPr lang="en-US" dirty="0"/>
           </a:p>
@@ -444,7 +1962,7 @@
             <a:fld id="{8256C2ED-54A4-480D-B5C8-65C0D62359B9}" type="datetime2">
               <a:rPr lang="en-US" smtClean="0"/>
               <a:pPr/>
-              <a:t>Friday, March 3, 2023</a:t>
+              <a:t>Sunday, March 5, 2023</a:t>
             </a:fld>
             <a:endParaRPr lang="en-US" dirty="0"/>
           </a:p>
@@ -603,7 +2121,7 @@
           <a:p>
             <a:fld id="{53CF612A-4CB0-4F57-9A87-F049CECB184D}" type="datetime2">
               <a:rPr lang="en-US" smtClean="0"/>
-              <a:t>Friday, March 3, 2023</a:t>
+              <a:t>Sunday, March 5, 2023</a:t>
             </a:fld>
             <a:endParaRPr lang="en-US"/>
           </a:p>
@@ -660,7 +2178,7 @@
           <a:p>
             <a:fld id="{0D309695-DEC3-40DA-9DF5-330280C9D0E8}" type="slidenum">
               <a:rPr lang="en-US" smtClean="0"/>
-              <a:t>‹#›</a:t>
+              <a:t>‹Nº›</a:t>
             </a:fld>
             <a:endParaRPr lang="en-US"/>
           </a:p>
@@ -824,7 +2342,7 @@
           <a:p>
             <a:fld id="{8F397F40-C8F7-4897-A6B8-241042F913A9}" type="datetime2">
               <a:rPr lang="en-US" smtClean="0"/>
-              <a:t>Friday, March 3, 2023</a:t>
+              <a:t>Sunday, March 5, 2023</a:t>
             </a:fld>
             <a:endParaRPr lang="en-US"/>
           </a:p>
@@ -881,7 +2399,7 @@
           <a:p>
             <a:fld id="{0D309695-DEC3-40DA-9DF5-330280C9D0E8}" type="slidenum">
               <a:rPr lang="en-US" smtClean="0"/>
-              <a:t>‹#›</a:t>
+              <a:t>‹Nº›</a:t>
             </a:fld>
             <a:endParaRPr lang="en-US"/>
           </a:p>
@@ -1097,7 +2615,7 @@
             <a:fld id="{0D309695-DEC3-40DA-9DF5-330280C9D0E8}" type="slidenum">
               <a:rPr lang="en-US" smtClean="0"/>
               <a:pPr/>
-              <a:t>‹#›</a:t>
+              <a:t>‹Nº›</a:t>
             </a:fld>
             <a:endParaRPr lang="en-US" dirty="0"/>
           </a:p>
@@ -1147,7 +2665,7 @@
             <a:fld id="{8256C2ED-54A4-480D-B5C8-65C0D62359B9}" type="datetime2">
               <a:rPr lang="en-US" smtClean="0"/>
               <a:pPr/>
-              <a:t>Friday, March 3, 2023</a:t>
+              <a:t>Sunday, March 5, 2023</a:t>
             </a:fld>
             <a:endParaRPr lang="en-US" dirty="0"/>
           </a:p>
@@ -1382,7 +2900,7 @@
           <a:p>
             <a:fld id="{10EDCA73-0A86-4195-A787-75037827079D}" type="datetime2">
               <a:rPr lang="en-US" smtClean="0"/>
-              <a:t>Friday, March 3, 2023</a:t>
+              <a:t>Sunday, March 5, 2023</a:t>
             </a:fld>
             <a:endParaRPr lang="en-US"/>
           </a:p>
@@ -1439,7 +2957,7 @@
           <a:p>
             <a:fld id="{0D309695-DEC3-40DA-9DF5-330280C9D0E8}" type="slidenum">
               <a:rPr lang="en-US" smtClean="0"/>
-              <a:t>‹#›</a:t>
+              <a:t>‹Nº›</a:t>
             </a:fld>
             <a:endParaRPr lang="en-US"/>
           </a:p>
@@ -1733,7 +3251,7 @@
           <a:p>
             <a:fld id="{83C75374-B296-498E-A935-80631EA9020D}" type="datetime2">
               <a:rPr lang="en-US" smtClean="0"/>
-              <a:t>Friday, March 3, 2023</a:t>
+              <a:t>Sunday, March 5, 2023</a:t>
             </a:fld>
             <a:endParaRPr lang="en-US"/>
           </a:p>
@@ -1790,7 +3308,7 @@
           <a:p>
             <a:fld id="{0D309695-DEC3-40DA-9DF5-330280C9D0E8}" type="slidenum">
               <a:rPr lang="en-US" smtClean="0"/>
-              <a:t>‹#›</a:t>
+              <a:t>‹Nº›</a:t>
             </a:fld>
             <a:endParaRPr lang="en-US"/>
           </a:p>
@@ -2173,7 +3691,7 @@
           <a:p>
             <a:fld id="{B098B728-214A-4ABC-8432-5B3A5A66A987}" type="datetime2">
               <a:rPr lang="en-US" smtClean="0"/>
-              <a:t>Friday, March 3, 2023</a:t>
+              <a:t>Sunday, March 5, 2023</a:t>
             </a:fld>
             <a:endParaRPr lang="en-US" dirty="0"/>
           </a:p>
@@ -2230,7 +3748,7 @@
           <a:p>
             <a:fld id="{0D309695-DEC3-40DA-9DF5-330280C9D0E8}" type="slidenum">
               <a:rPr lang="en-US" smtClean="0"/>
-              <a:t>‹#›</a:t>
+              <a:t>‹Nº›</a:t>
             </a:fld>
             <a:endParaRPr lang="en-US"/>
           </a:p>
@@ -2331,7 +3849,7 @@
           <a:p>
             <a:fld id="{015F02D0-6806-43AF-9888-2359BF40C204}" type="datetime2">
               <a:rPr lang="en-US" smtClean="0"/>
-              <a:t>Friday, March 3, 2023</a:t>
+              <a:t>Sunday, March 5, 2023</a:t>
             </a:fld>
             <a:endParaRPr lang="en-US"/>
           </a:p>
@@ -2388,7 +3906,7 @@
           <a:p>
             <a:fld id="{0D309695-DEC3-40DA-9DF5-330280C9D0E8}" type="slidenum">
               <a:rPr lang="en-US" smtClean="0"/>
-              <a:t>‹#›</a:t>
+              <a:t>‹Nº›</a:t>
             </a:fld>
             <a:endParaRPr lang="en-US"/>
           </a:p>
@@ -2455,7 +3973,7 @@
           <a:p>
             <a:fld id="{8EE14D2D-B1AF-4197-82D6-FC1F8BD05681}" type="datetime2">
               <a:rPr lang="en-US" smtClean="0"/>
-              <a:t>Friday, March 3, 2023</a:t>
+              <a:t>Sunday, March 5, 2023</a:t>
             </a:fld>
             <a:endParaRPr lang="en-US"/>
           </a:p>
@@ -2512,7 +4030,7 @@
           <a:p>
             <a:fld id="{0D309695-DEC3-40DA-9DF5-330280C9D0E8}" type="slidenum">
               <a:rPr lang="en-US" smtClean="0"/>
-              <a:t>‹#›</a:t>
+              <a:t>‹Nº›</a:t>
             </a:fld>
             <a:endParaRPr lang="en-US"/>
           </a:p>
@@ -2783,7 +4301,7 @@
           <a:p>
             <a:fld id="{98771CEB-9838-4245-91B8-EFBAFE2D8B44}" type="datetime2">
               <a:rPr lang="en-US" smtClean="0"/>
-              <a:t>Friday, March 3, 2023</a:t>
+              <a:t>Sunday, March 5, 2023</a:t>
             </a:fld>
             <a:endParaRPr lang="en-US"/>
           </a:p>
@@ -2840,7 +4358,7 @@
           <a:p>
             <a:fld id="{0D309695-DEC3-40DA-9DF5-330280C9D0E8}" type="slidenum">
               <a:rPr lang="en-US" smtClean="0"/>
-              <a:t>‹#›</a:t>
+              <a:t>‹Nº›</a:t>
             </a:fld>
             <a:endParaRPr lang="en-US"/>
           </a:p>
@@ -3091,7 +4609,7 @@
           <a:p>
             <a:fld id="{51D3F6BF-A585-41F8-88DF-7E5D069F892A}" type="datetime2">
               <a:rPr lang="en-US" smtClean="0"/>
-              <a:t>Friday, March 3, 2023</a:t>
+              <a:t>Sunday, March 5, 2023</a:t>
             </a:fld>
             <a:endParaRPr lang="en-US"/>
           </a:p>
@@ -3148,7 +4666,7 @@
           <a:p>
             <a:fld id="{0D309695-DEC3-40DA-9DF5-330280C9D0E8}" type="slidenum">
               <a:rPr lang="en-US" smtClean="0"/>
-              <a:t>‹#›</a:t>
+              <a:t>‹Nº›</a:t>
             </a:fld>
             <a:endParaRPr lang="en-US"/>
           </a:p>
@@ -3384,7 +4902,7 @@
             <a:fld id="{0D309695-DEC3-40DA-9DF5-330280C9D0E8}" type="slidenum">
               <a:rPr lang="en-US" smtClean="0"/>
               <a:pPr/>
-              <a:t>‹#›</a:t>
+              <a:t>‹Nº›</a:t>
             </a:fld>
             <a:endParaRPr lang="en-US" dirty="0"/>
           </a:p>
@@ -3434,7 +4952,7 @@
             <a:fld id="{8256C2ED-54A4-480D-B5C8-65C0D62359B9}" type="datetime2">
               <a:rPr lang="en-US" smtClean="0"/>
               <a:pPr/>
-              <a:t>Friday, March 3, 2023</a:t>
+              <a:t>Sunday, March 5, 2023</a:t>
             </a:fld>
             <a:endParaRPr lang="en-US" dirty="0"/>
           </a:p>
@@ -4231,7 +5749,7 @@
           </p:nvPr>
         </p:nvPicPr>
         <p:blipFill>
-          <a:blip r:embed="rId2"/>
+          <a:blip r:embed="rId3"/>
           <a:stretch>
             <a:fillRect/>
           </a:stretch>
@@ -4377,7 +5895,16 @@
           <a:bodyPr/>
           <a:lstStyle/>
           <a:p>
-            <a:endParaRPr lang="en-US" dirty="0"/>
+            <a:r>
+              <a:rPr lang="en-US" dirty="0"/>
+              <a:t>Used to determine whether a time series can forecast another one</a:t>
+            </a:r>
+          </a:p>
+          <a:p>
+            <a:r>
+              <a:rPr lang="en-US" dirty="0"/>
+              <a:t>Although called the Granger causality test, it is more appropriate to say it tests if one forecasts the other</a:t>
+            </a:r>
           </a:p>
         </p:txBody>
       </p:sp>
@@ -4397,6 +5924,14 @@
 <file path=ppt/slides/slide12.xml><?xml version="1.0" encoding="utf-8"?>
 <p:sld xmlns:a="http://schemas.openxmlformats.org/drawingml/2006/main" xmlns:r="http://schemas.openxmlformats.org/officeDocument/2006/relationships" xmlns:p="http://schemas.openxmlformats.org/presentationml/2006/main">
   <p:cSld>
+    <p:bg>
+      <p:bgPr>
+        <a:solidFill>
+          <a:schemeClr val="bg2"/>
+        </a:solidFill>
+        <a:effectLst/>
+      </p:bgPr>
+    </p:bg>
     <p:spTree>
       <p:nvGrpSpPr>
         <p:cNvPr id="1" name=""/>
@@ -4411,12 +5946,88 @@
           <a:chExt cx="0" cy="0"/>
         </a:xfrm>
       </p:grpSpPr>
+      <p:sp useBgFill="1">
+        <p:nvSpPr>
+          <p:cNvPr id="22" name="Rectangle 17">
+            <a:extLst>
+              <a:ext uri="{FF2B5EF4-FFF2-40B4-BE49-F238E27FC236}">
+                <a16:creationId xmlns:a16="http://schemas.microsoft.com/office/drawing/2014/main" id="{2A6A41AD-B3AC-47B3-BC30-A29086AF2C5C}"/>
+              </a:ext>
+              <a:ext uri="{C183D7F6-B498-43B3-948B-1728B52AA6E4}">
+                <adec:decorative xmlns:adec="http://schemas.microsoft.com/office/drawing/2017/decorative" val="1"/>
+              </a:ext>
+            </a:extLst>
+          </p:cNvPr>
+          <p:cNvSpPr>
+            <a:spLocks noGrp="1" noRot="1" noChangeAspect="1" noMove="1" noResize="1" noEditPoints="1" noAdjustHandles="1" noChangeArrowheads="1" noChangeShapeType="1" noTextEdit="1"/>
+          </p:cNvSpPr>
+          <p:nvPr>
+            <p:extLst>
+              <p:ext uri="{386F3935-93C4-4BCD-93E2-E3B085C9AB24}">
+                <p16:designElem xmlns:p16="http://schemas.microsoft.com/office/powerpoint/2015/main" val="1"/>
+              </p:ext>
+            </p:extLst>
+          </p:nvPr>
+        </p:nvSpPr>
+        <p:spPr>
+          <a:xfrm>
+            <a:off x="0" y="0"/>
+            <a:ext cx="12192000" cy="6858000"/>
+          </a:xfrm>
+          <a:prstGeom prst="rect">
+            <a:avLst/>
+          </a:prstGeom>
+          <a:ln w="12700" cap="flat" cmpd="sng" algn="ctr">
+            <a:noFill/>
+            <a:prstDash val="solid"/>
+            <a:miter lim="800000"/>
+          </a:ln>
+          <a:effectLst/>
+          <a:extLst>
+            <a:ext uri="{91240B29-F687-4F45-9708-019B960494DF}">
+              <a14:hiddenLine xmlns:a14="http://schemas.microsoft.com/office/drawing/2010/main" w="12700" cap="flat" cmpd="sng" algn="ctr">
+                <a:solidFill>
+                  <a:schemeClr val="accent1">
+                    <a:shade val="50000"/>
+                  </a:schemeClr>
+                </a:solidFill>
+                <a:prstDash val="solid"/>
+                <a:miter lim="800000"/>
+              </a14:hiddenLine>
+            </a:ext>
+          </a:extLst>
+        </p:spPr>
+        <p:style>
+          <a:lnRef idx="2">
+            <a:schemeClr val="accent1">
+              <a:shade val="50000"/>
+            </a:schemeClr>
+          </a:lnRef>
+          <a:fillRef idx="1">
+            <a:schemeClr val="accent1"/>
+          </a:fillRef>
+          <a:effectRef idx="0">
+            <a:schemeClr val="accent1"/>
+          </a:effectRef>
+          <a:fontRef idx="minor">
+            <a:schemeClr val="lt1"/>
+          </a:fontRef>
+        </p:style>
+        <p:txBody>
+          <a:bodyPr rtlCol="0" anchor="ctr"/>
+          <a:lstStyle/>
+          <a:p>
+            <a:pPr algn="ctr"/>
+            <a:endParaRPr lang="en-US"/>
+          </a:p>
+        </p:txBody>
+      </p:sp>
       <p:sp>
         <p:nvSpPr>
           <p:cNvPr id="2" name="Title 1">
             <a:extLst>
               <a:ext uri="{FF2B5EF4-FFF2-40B4-BE49-F238E27FC236}">
-                <a16:creationId xmlns:a16="http://schemas.microsoft.com/office/drawing/2014/main" id="{3FCAF825-BFE2-1F88-6D45-0C0E50AD3881}"/>
+                <a16:creationId xmlns:a16="http://schemas.microsoft.com/office/drawing/2014/main" id="{B358E8B0-D708-DE68-C1C5-D80A3353323C}"/>
               </a:ext>
             </a:extLst>
           </p:cNvPr>
@@ -4427,24 +6038,83 @@
             <p:ph type="title"/>
           </p:nvPr>
         </p:nvSpPr>
-        <p:spPr/>
-        <p:txBody>
-          <a:bodyPr/>
+        <p:spPr>
+          <a:xfrm>
+            <a:off x="448056" y="388800"/>
+            <a:ext cx="3452432" cy="860400"/>
+          </a:xfrm>
+        </p:spPr>
+        <p:txBody>
+          <a:bodyPr anchor="b">
+            <a:normAutofit/>
+          </a:bodyPr>
           <a:lstStyle/>
           <a:p>
             <a:r>
               <a:rPr lang="en-US" dirty="0"/>
-              <a:t>Conclusions</a:t>
-            </a:r>
-          </a:p>
-        </p:txBody>
-      </p:sp>
+              <a:t>Granger Results</a:t>
+            </a:r>
+          </a:p>
+        </p:txBody>
+      </p:sp>
+      <p:cxnSp>
+        <p:nvCxnSpPr>
+          <p:cNvPr id="23" name="Straight Connector 19">
+            <a:extLst>
+              <a:ext uri="{FF2B5EF4-FFF2-40B4-BE49-F238E27FC236}">
+                <a16:creationId xmlns:a16="http://schemas.microsoft.com/office/drawing/2014/main" id="{B32E796E-8D19-4926-B7B8-653B01939010}"/>
+              </a:ext>
+              <a:ext uri="{C183D7F6-B498-43B3-948B-1728B52AA6E4}">
+                <adec:decorative xmlns:adec="http://schemas.microsoft.com/office/drawing/2017/decorative" val="1"/>
+              </a:ext>
+            </a:extLst>
+          </p:cNvPr>
+          <p:cNvCxnSpPr>
+            <a:cxnSpLocks noGrp="1" noRot="1" noChangeAspect="1" noMove="1" noResize="1" noEditPoints="1" noAdjustHandles="1" noChangeArrowheads="1" noChangeShapeType="1"/>
+          </p:cNvCxnSpPr>
+          <p:nvPr>
+            <p:extLst>
+              <p:ext uri="{386F3935-93C4-4BCD-93E2-E3B085C9AB24}">
+                <p16:designElem xmlns:p16="http://schemas.microsoft.com/office/powerpoint/2015/main" val="1"/>
+              </p:ext>
+            </p:extLst>
+          </p:nvPr>
+        </p:nvCxnSpPr>
+        <p:spPr>
+          <a:xfrm>
+            <a:off x="450000" y="1609200"/>
+            <a:ext cx="3454116" cy="0"/>
+          </a:xfrm>
+          <a:prstGeom prst="line">
+            <a:avLst/>
+          </a:prstGeom>
+          <a:ln w="6350">
+            <a:solidFill>
+              <a:schemeClr val="tx2"/>
+            </a:solidFill>
+          </a:ln>
+        </p:spPr>
+        <p:style>
+          <a:lnRef idx="1">
+            <a:schemeClr val="accent1"/>
+          </a:lnRef>
+          <a:fillRef idx="0">
+            <a:schemeClr val="accent1"/>
+          </a:fillRef>
+          <a:effectRef idx="0">
+            <a:schemeClr val="accent1"/>
+          </a:effectRef>
+          <a:fontRef idx="minor">
+            <a:schemeClr val="tx1"/>
+          </a:fontRef>
+        </p:style>
+      </p:cxnSp>
       <p:sp>
         <p:nvSpPr>
           <p:cNvPr id="3" name="Content Placeholder 2">
             <a:extLst>
               <a:ext uri="{FF2B5EF4-FFF2-40B4-BE49-F238E27FC236}">
-                <a16:creationId xmlns:a16="http://schemas.microsoft.com/office/drawing/2014/main" id="{F4A1A434-B2FE-3303-F06D-9F94063CD619}"/>
+                <a16:creationId xmlns:a16="http://schemas.microsoft.com/office/drawing/2014/main" id="{BE8EF69F-9378-AB6C-1A95-9AB831D465B3}"/>
               </a:ext>
             </a:extLst>
           </p:cNvPr>
@@ -4455,28 +6125,207 @@
             <p:ph idx="1"/>
           </p:nvPr>
         </p:nvSpPr>
-        <p:spPr/>
-        <p:txBody>
-          <a:bodyPr/>
-          <a:lstStyle/>
-          <a:p>
-            <a:r>
-              <a:rPr lang="en-US" dirty="0"/>
-              <a:t>There is a moderate correlation between these two variables when crime is converted to per 100,000. </a:t>
-            </a:r>
-          </a:p>
-          <a:p>
-            <a:r>
-              <a:rPr lang="en-US" dirty="0"/>
-              <a:t>All correlation tests generated p-values under .05. </a:t>
-            </a:r>
-          </a:p>
-        </p:txBody>
-      </p:sp>
+        <p:spPr>
+          <a:xfrm>
+            <a:off x="448056" y="1944000"/>
+            <a:ext cx="3452432" cy="4006800"/>
+          </a:xfrm>
+        </p:spPr>
+        <p:txBody>
+          <a:bodyPr>
+            <a:normAutofit/>
+          </a:bodyPr>
+          <a:lstStyle/>
+          <a:p>
+            <a:pPr>
+              <a:lnSpc>
+                <a:spcPct val="110000"/>
+              </a:lnSpc>
+            </a:pPr>
+            <a:r>
+              <a:rPr lang="en-US" sz="2000"/>
+              <a:t>The tests were performed on 3 monetary related statistics: total crime, property related crimes, and burglary.</a:t>
+            </a:r>
+          </a:p>
+          <a:p>
+            <a:pPr>
+              <a:lnSpc>
+                <a:spcPct val="110000"/>
+              </a:lnSpc>
+            </a:pPr>
+            <a:r>
+              <a:rPr lang="en-US" sz="2000"/>
+              <a:t>From those 3, we could reject the null hypothesis for all 3, which indicates that knowing the inflation rate can be used to forecast the crime rates. </a:t>
+            </a:r>
+          </a:p>
+        </p:txBody>
+      </p:sp>
+      <p:pic>
+        <p:nvPicPr>
+          <p:cNvPr id="5" name="Imagen 4">
+            <a:extLst>
+              <a:ext uri="{FF2B5EF4-FFF2-40B4-BE49-F238E27FC236}">
+                <a16:creationId xmlns:a16="http://schemas.microsoft.com/office/drawing/2014/main" id="{D1300A37-E8BE-9EC9-D6B6-686CBC2B08F5}"/>
+              </a:ext>
+            </a:extLst>
+          </p:cNvPr>
+          <p:cNvPicPr>
+            <a:picLocks noChangeAspect="1"/>
+          </p:cNvPicPr>
+          <p:nvPr/>
+        </p:nvPicPr>
+        <p:blipFill>
+          <a:blip r:embed="rId2"/>
+          <a:stretch>
+            <a:fillRect/>
+          </a:stretch>
+        </p:blipFill>
+        <p:spPr>
+          <a:xfrm>
+            <a:off x="4367213" y="2772359"/>
+            <a:ext cx="3597022" cy="863285"/>
+          </a:xfrm>
+          <a:custGeom>
+            <a:avLst/>
+            <a:gdLst/>
+            <a:ahLst/>
+            <a:cxnLst/>
+            <a:rect l="l" t="t" r="r" b="b"/>
+            <a:pathLst>
+              <a:path w="3597022" h="2664002">
+                <a:moveTo>
+                  <a:pt x="0" y="0"/>
+                </a:moveTo>
+                <a:lnTo>
+                  <a:pt x="3597022" y="0"/>
+                </a:lnTo>
+                <a:lnTo>
+                  <a:pt x="3597022" y="2664002"/>
+                </a:lnTo>
+                <a:lnTo>
+                  <a:pt x="0" y="2664002"/>
+                </a:lnTo>
+                <a:lnTo>
+                  <a:pt x="0" y="0"/>
+                </a:lnTo>
+                <a:close/>
+              </a:path>
+            </a:pathLst>
+          </a:custGeom>
+        </p:spPr>
+      </p:pic>
+      <p:pic>
+        <p:nvPicPr>
+          <p:cNvPr id="13" name="Imagen 12">
+            <a:extLst>
+              <a:ext uri="{FF2B5EF4-FFF2-40B4-BE49-F238E27FC236}">
+                <a16:creationId xmlns:a16="http://schemas.microsoft.com/office/drawing/2014/main" id="{FE4BCA27-80D4-9E8C-68DF-B8E70EB78EDC}"/>
+              </a:ext>
+            </a:extLst>
+          </p:cNvPr>
+          <p:cNvPicPr>
+            <a:picLocks noChangeAspect="1"/>
+          </p:cNvPicPr>
+          <p:nvPr/>
+        </p:nvPicPr>
+        <p:blipFill>
+          <a:blip r:embed="rId3"/>
+          <a:stretch>
+            <a:fillRect/>
+          </a:stretch>
+        </p:blipFill>
+        <p:spPr>
+          <a:xfrm>
+            <a:off x="8144235" y="1471758"/>
+            <a:ext cx="3597022" cy="620486"/>
+          </a:xfrm>
+          <a:custGeom>
+            <a:avLst/>
+            <a:gdLst/>
+            <a:ahLst/>
+            <a:cxnLst/>
+            <a:rect l="l" t="t" r="r" b="b"/>
+            <a:pathLst>
+              <a:path w="3597022" h="2664000">
+                <a:moveTo>
+                  <a:pt x="0" y="0"/>
+                </a:moveTo>
+                <a:lnTo>
+                  <a:pt x="3597022" y="0"/>
+                </a:lnTo>
+                <a:lnTo>
+                  <a:pt x="3597022" y="2664000"/>
+                </a:lnTo>
+                <a:lnTo>
+                  <a:pt x="0" y="2664000"/>
+                </a:lnTo>
+                <a:lnTo>
+                  <a:pt x="0" y="0"/>
+                </a:lnTo>
+                <a:close/>
+              </a:path>
+            </a:pathLst>
+          </a:custGeom>
+        </p:spPr>
+      </p:pic>
+      <p:pic>
+        <p:nvPicPr>
+          <p:cNvPr id="7" name="Imagen 6">
+            <a:extLst>
+              <a:ext uri="{FF2B5EF4-FFF2-40B4-BE49-F238E27FC236}">
+                <a16:creationId xmlns:a16="http://schemas.microsoft.com/office/drawing/2014/main" id="{817DC601-0B03-4B4A-6752-E8BDCF39F6D1}"/>
+              </a:ext>
+            </a:extLst>
+          </p:cNvPr>
+          <p:cNvPicPr>
+            <a:picLocks noChangeAspect="1"/>
+          </p:cNvPicPr>
+          <p:nvPr/>
+        </p:nvPicPr>
+        <p:blipFill>
+          <a:blip r:embed="rId4"/>
+          <a:stretch>
+            <a:fillRect/>
+          </a:stretch>
+        </p:blipFill>
+        <p:spPr>
+          <a:xfrm>
+            <a:off x="8144235" y="4320255"/>
+            <a:ext cx="3597022" cy="611493"/>
+          </a:xfrm>
+          <a:custGeom>
+            <a:avLst/>
+            <a:gdLst/>
+            <a:ahLst/>
+            <a:cxnLst/>
+            <a:rect l="l" t="t" r="r" b="b"/>
+            <a:pathLst>
+              <a:path w="3597022" h="5508002">
+                <a:moveTo>
+                  <a:pt x="0" y="0"/>
+                </a:moveTo>
+                <a:lnTo>
+                  <a:pt x="3597022" y="0"/>
+                </a:lnTo>
+                <a:lnTo>
+                  <a:pt x="3597022" y="5508002"/>
+                </a:lnTo>
+                <a:lnTo>
+                  <a:pt x="0" y="5508002"/>
+                </a:lnTo>
+                <a:lnTo>
+                  <a:pt x="0" y="0"/>
+                </a:lnTo>
+                <a:close/>
+              </a:path>
+            </a:pathLst>
+          </a:custGeom>
+        </p:spPr>
+      </p:pic>
     </p:spTree>
     <p:extLst>
       <p:ext uri="{BB962C8B-B14F-4D97-AF65-F5344CB8AC3E}">
-        <p14:creationId xmlns:p14="http://schemas.microsoft.com/office/powerpoint/2010/main" val="1166813317"/>
+        <p14:creationId xmlns:p14="http://schemas.microsoft.com/office/powerpoint/2010/main" val="822615812"/>
       </p:ext>
     </p:extLst>
   </p:cSld>
@@ -4505,10 +6354,10 @@
       </p:grpSpPr>
       <p:sp>
         <p:nvSpPr>
-          <p:cNvPr id="4" name="Title 3">
-            <a:extLst>
-              <a:ext uri="{FF2B5EF4-FFF2-40B4-BE49-F238E27FC236}">
-                <a16:creationId xmlns:a16="http://schemas.microsoft.com/office/drawing/2014/main" id="{D016E065-19BB-8F19-61E2-FE37ED95DD88}"/>
+          <p:cNvPr id="2" name="Title 1">
+            <a:extLst>
+              <a:ext uri="{FF2B5EF4-FFF2-40B4-BE49-F238E27FC236}">
+                <a16:creationId xmlns:a16="http://schemas.microsoft.com/office/drawing/2014/main" id="{3FCAF825-BFE2-1F88-6D45-0C0E50AD3881}"/>
               </a:ext>
             </a:extLst>
           </p:cNvPr>
@@ -4526,25 +6375,25 @@
           <a:p>
             <a:r>
               <a:rPr lang="en-US" dirty="0"/>
-              <a:t>Models</a:t>
-            </a:r>
-          </a:p>
-        </p:txBody>
-      </p:sp>
-      <p:sp>
-        <p:nvSpPr>
-          <p:cNvPr id="5" name="Text Placeholder 4">
-            <a:extLst>
-              <a:ext uri="{FF2B5EF4-FFF2-40B4-BE49-F238E27FC236}">
-                <a16:creationId xmlns:a16="http://schemas.microsoft.com/office/drawing/2014/main" id="{140B0503-30D3-3E2B-C4B6-0305DCDC47C6}"/>
-              </a:ext>
-            </a:extLst>
-          </p:cNvPr>
-          <p:cNvSpPr>
-            <a:spLocks noGrp="1"/>
-          </p:cNvSpPr>
-          <p:nvPr>
-            <p:ph type="body" idx="1"/>
+              <a:t>Conclusions</a:t>
+            </a:r>
+          </a:p>
+        </p:txBody>
+      </p:sp>
+      <p:sp>
+        <p:nvSpPr>
+          <p:cNvPr id="3" name="Content Placeholder 2">
+            <a:extLst>
+              <a:ext uri="{FF2B5EF4-FFF2-40B4-BE49-F238E27FC236}">
+                <a16:creationId xmlns:a16="http://schemas.microsoft.com/office/drawing/2014/main" id="{F4A1A434-B2FE-3303-F06D-9F94063CD619}"/>
+              </a:ext>
+            </a:extLst>
+          </p:cNvPr>
+          <p:cNvSpPr>
+            <a:spLocks noGrp="1"/>
+          </p:cNvSpPr>
+          <p:nvPr>
+            <p:ph idx="1"/>
           </p:nvPr>
         </p:nvSpPr>
         <p:spPr/>
@@ -4552,14 +6401,23 @@
           <a:bodyPr/>
           <a:lstStyle/>
           <a:p>
-            <a:endParaRPr lang="en-US"/>
+            <a:r>
+              <a:rPr lang="en-US" dirty="0"/>
+              <a:t>There is a moderate correlation between these two variables when crime is converted to per 100,000. </a:t>
+            </a:r>
+          </a:p>
+          <a:p>
+            <a:r>
+              <a:rPr lang="en-US" dirty="0"/>
+              <a:t>All correlation tests generated p-values under .05. </a:t>
+            </a:r>
           </a:p>
         </p:txBody>
       </p:sp>
     </p:spTree>
     <p:extLst>
       <p:ext uri="{BB962C8B-B14F-4D97-AF65-F5344CB8AC3E}">
-        <p14:creationId xmlns:p14="http://schemas.microsoft.com/office/powerpoint/2010/main" val="2021864562"/>
+        <p14:creationId xmlns:p14="http://schemas.microsoft.com/office/powerpoint/2010/main" val="1166813317"/>
       </p:ext>
     </p:extLst>
   </p:cSld>
@@ -4588,6 +6446,89 @@
       </p:grpSpPr>
       <p:sp>
         <p:nvSpPr>
+          <p:cNvPr id="4" name="Title 3">
+            <a:extLst>
+              <a:ext uri="{FF2B5EF4-FFF2-40B4-BE49-F238E27FC236}">
+                <a16:creationId xmlns:a16="http://schemas.microsoft.com/office/drawing/2014/main" id="{D016E065-19BB-8F19-61E2-FE37ED95DD88}"/>
+              </a:ext>
+            </a:extLst>
+          </p:cNvPr>
+          <p:cNvSpPr>
+            <a:spLocks noGrp="1"/>
+          </p:cNvSpPr>
+          <p:nvPr>
+            <p:ph type="title"/>
+          </p:nvPr>
+        </p:nvSpPr>
+        <p:spPr/>
+        <p:txBody>
+          <a:bodyPr/>
+          <a:lstStyle/>
+          <a:p>
+            <a:r>
+              <a:rPr lang="en-US" dirty="0"/>
+              <a:t>Models</a:t>
+            </a:r>
+          </a:p>
+        </p:txBody>
+      </p:sp>
+      <p:sp>
+        <p:nvSpPr>
+          <p:cNvPr id="5" name="Text Placeholder 4">
+            <a:extLst>
+              <a:ext uri="{FF2B5EF4-FFF2-40B4-BE49-F238E27FC236}">
+                <a16:creationId xmlns:a16="http://schemas.microsoft.com/office/drawing/2014/main" id="{140B0503-30D3-3E2B-C4B6-0305DCDC47C6}"/>
+              </a:ext>
+            </a:extLst>
+          </p:cNvPr>
+          <p:cNvSpPr>
+            <a:spLocks noGrp="1"/>
+          </p:cNvSpPr>
+          <p:nvPr>
+            <p:ph type="body" idx="1"/>
+          </p:nvPr>
+        </p:nvSpPr>
+        <p:spPr/>
+        <p:txBody>
+          <a:bodyPr/>
+          <a:lstStyle/>
+          <a:p>
+            <a:endParaRPr lang="en-US"/>
+          </a:p>
+        </p:txBody>
+      </p:sp>
+    </p:spTree>
+    <p:extLst>
+      <p:ext uri="{BB962C8B-B14F-4D97-AF65-F5344CB8AC3E}">
+        <p14:creationId xmlns:p14="http://schemas.microsoft.com/office/powerpoint/2010/main" val="2021864562"/>
+      </p:ext>
+    </p:extLst>
+  </p:cSld>
+  <p:clrMapOvr>
+    <a:masterClrMapping/>
+  </p:clrMapOvr>
+</p:sld>
+</file>
+
+<file path=ppt/slides/slide15.xml><?xml version="1.0" encoding="utf-8"?>
+<p:sld xmlns:a="http://schemas.openxmlformats.org/drawingml/2006/main" xmlns:r="http://schemas.openxmlformats.org/officeDocument/2006/relationships" xmlns:p="http://schemas.openxmlformats.org/presentationml/2006/main">
+  <p:cSld>
+    <p:spTree>
+      <p:nvGrpSpPr>
+        <p:cNvPr id="1" name=""/>
+        <p:cNvGrpSpPr/>
+        <p:nvPr/>
+      </p:nvGrpSpPr>
+      <p:grpSpPr>
+        <a:xfrm>
+          <a:off x="0" y="0"/>
+          <a:ext cx="0" cy="0"/>
+          <a:chOff x="0" y="0"/>
+          <a:chExt cx="0" cy="0"/>
+        </a:xfrm>
+      </p:grpSpPr>
+      <p:sp>
+        <p:nvSpPr>
           <p:cNvPr id="2" name="Title 1">
             <a:extLst>
               <a:ext uri="{FF2B5EF4-FFF2-40B4-BE49-F238E27FC236}">
@@ -4652,7 +6593,7 @@
 </p:sld>
 </file>
 
-<file path=ppt/slides/slide15.xml><?xml version="1.0" encoding="utf-8"?>
+<file path=ppt/slides/slide16.xml><?xml version="1.0" encoding="utf-8"?>
 <p:sld xmlns:a="http://schemas.openxmlformats.org/drawingml/2006/main" xmlns:r="http://schemas.openxmlformats.org/officeDocument/2006/relationships" xmlns:p="http://schemas.openxmlformats.org/presentationml/2006/main">
   <p:cSld>
     <p:bg>
@@ -4914,7 +6855,7 @@
 </p:sld>
 </file>
 
-<file path=ppt/slides/slide16.xml><?xml version="1.0" encoding="utf-8"?>
+<file path=ppt/slides/slide17.xml><?xml version="1.0" encoding="utf-8"?>
 <p:sld xmlns:a="http://schemas.openxmlformats.org/drawingml/2006/main" xmlns:r="http://schemas.openxmlformats.org/officeDocument/2006/relationships" xmlns:p="http://schemas.openxmlformats.org/presentationml/2006/main">
   <p:cSld>
     <p:spTree>
@@ -5202,10 +7143,10 @@
           <p:nvPr/>
         </p:nvPicPr>
         <p:blipFill>
-          <a:blip r:embed="rId2">
+          <a:blip r:embed="rId3">
             <a:extLst>
               <a:ext uri="{96DAC541-7B7A-43D3-8B79-37D633B846F1}">
-                <asvg:svgBlip xmlns:asvg="http://schemas.microsoft.com/office/drawing/2016/SVG/main" r:embed="rId3"/>
+                <asvg:svgBlip xmlns:asvg="http://schemas.microsoft.com/office/drawing/2016/SVG/main" r:embed="rId4"/>
               </a:ext>
             </a:extLst>
           </a:blip>
@@ -5291,7 +7232,7 @@
           <p:nvPr/>
         </p:nvPicPr>
         <p:blipFill>
-          <a:blip r:embed="rId4"/>
+          <a:blip r:embed="rId5"/>
           <a:stretch>
             <a:fillRect/>
           </a:stretch>
@@ -5578,7 +7519,7 @@
           <p:nvPr/>
         </p:nvPicPr>
         <p:blipFill>
-          <a:blip r:embed="rId2"/>
+          <a:blip r:embed="rId3"/>
           <a:stretch>
             <a:fillRect/>
           </a:stretch>
@@ -5859,7 +7800,7 @@
           <p:nvPr/>
         </p:nvPicPr>
         <p:blipFill>
-          <a:blip r:embed="rId2"/>
+          <a:blip r:embed="rId3"/>
           <a:stretch>
             <a:fillRect/>
           </a:stretch>
@@ -5913,7 +7854,7 @@
           <p:nvPr/>
         </p:nvPicPr>
         <p:blipFill>
-          <a:blip r:embed="rId3"/>
+          <a:blip r:embed="rId4"/>
           <a:stretch>
             <a:fillRect/>
           </a:stretch>
@@ -5967,7 +7908,7 @@
           <p:nvPr/>
         </p:nvPicPr>
         <p:blipFill>
-          <a:blip r:embed="rId4"/>
+          <a:blip r:embed="rId5"/>
           <a:stretch>
             <a:fillRect/>
           </a:stretch>
@@ -6081,7 +8022,7 @@
           </p:nvPr>
         </p:nvPicPr>
         <p:blipFill>
-          <a:blip r:embed="rId2"/>
+          <a:blip r:embed="rId3"/>
           <a:stretch>
             <a:fillRect/>
           </a:stretch>
@@ -6111,7 +8052,7 @@
           <p:nvPr/>
         </p:nvPicPr>
         <p:blipFill>
-          <a:blip r:embed="rId3"/>
+          <a:blip r:embed="rId4"/>
           <a:stretch>
             <a:fillRect/>
           </a:stretch>
@@ -6224,7 +8165,7 @@
           <p:nvPr/>
         </p:nvPicPr>
         <p:blipFill>
-          <a:blip r:embed="rId2"/>
+          <a:blip r:embed="rId3"/>
           <a:stretch>
             <a:fillRect/>
           </a:stretch>
@@ -6254,7 +8195,7 @@
           <p:nvPr/>
         </p:nvPicPr>
         <p:blipFill>
-          <a:blip r:embed="rId3"/>
+          <a:blip r:embed="rId4"/>
           <a:stretch>
             <a:fillRect/>
           </a:stretch>
@@ -6322,36 +8263,41 @@
           <a:p>
             <a:r>
               <a:rPr lang="en-US" dirty="0"/>
-              <a:t>Antonio’s Visualization Slides</a:t>
-            </a:r>
-          </a:p>
-        </p:txBody>
-      </p:sp>
-      <p:sp>
-        <p:nvSpPr>
-          <p:cNvPr id="3" name="Content Placeholder 2">
-            <a:extLst>
-              <a:ext uri="{FF2B5EF4-FFF2-40B4-BE49-F238E27FC236}">
-                <a16:creationId xmlns:a16="http://schemas.microsoft.com/office/drawing/2014/main" id="{403B4C96-2620-56CA-3DC8-347420A72FBF}"/>
-              </a:ext>
-            </a:extLst>
-          </p:cNvPr>
-          <p:cNvSpPr>
-            <a:spLocks noGrp="1"/>
-          </p:cNvSpPr>
-          <p:nvPr>
-            <p:ph idx="1"/>
-          </p:nvPr>
-        </p:nvSpPr>
-        <p:spPr/>
-        <p:txBody>
-          <a:bodyPr/>
-          <a:lstStyle/>
-          <a:p>
-            <a:endParaRPr lang="en-US"/>
-          </a:p>
-        </p:txBody>
-      </p:sp>
+              <a:t>Inflation rate vs Crime percentage</a:t>
+            </a:r>
+          </a:p>
+        </p:txBody>
+      </p:sp>
+      <p:pic>
+        <p:nvPicPr>
+          <p:cNvPr id="5" name="Imagen 4" descr="Gráfico, Histograma&#10;&#10;Descripción generada automáticamente">
+            <a:extLst>
+              <a:ext uri="{FF2B5EF4-FFF2-40B4-BE49-F238E27FC236}">
+                <a16:creationId xmlns:a16="http://schemas.microsoft.com/office/drawing/2014/main" id="{08834197-ED68-6611-27A6-7DDFE230301B}"/>
+              </a:ext>
+            </a:extLst>
+          </p:cNvPr>
+          <p:cNvPicPr>
+            <a:picLocks noChangeAspect="1"/>
+          </p:cNvPicPr>
+          <p:nvPr/>
+        </p:nvPicPr>
+        <p:blipFill>
+          <a:blip r:embed="rId3"/>
+          <a:stretch>
+            <a:fillRect/>
+          </a:stretch>
+        </p:blipFill>
+        <p:spPr>
+          <a:xfrm>
+            <a:off x="4120297" y="1777387"/>
+            <a:ext cx="3951405" cy="3303225"/>
+          </a:xfrm>
+          <a:prstGeom prst="rect">
+            <a:avLst/>
+          </a:prstGeom>
+        </p:spPr>
+      </p:pic>
     </p:spTree>
     <p:extLst>
       <p:ext uri="{BB962C8B-B14F-4D97-AF65-F5344CB8AC3E}">
@@ -6510,7 +8456,7 @@
           </p:nvPr>
         </p:nvPicPr>
         <p:blipFill>
-          <a:blip r:embed="rId2"/>
+          <a:blip r:embed="rId3"/>
           <a:stretch>
             <a:fillRect/>
           </a:stretch>
@@ -6540,7 +8486,7 @@
           <p:nvPr/>
         </p:nvPicPr>
         <p:blipFill>
-          <a:blip r:embed="rId3"/>
+          <a:blip r:embed="rId4"/>
           <a:stretch>
             <a:fillRect/>
           </a:stretch>
@@ -6736,4 +8682,299 @@
     </a:ext>
   </a:extLst>
 </a:theme>
+</file>
+
+<file path=ppt/theme/theme2.xml><?xml version="1.0" encoding="utf-8"?>
+<a:theme xmlns:a="http://schemas.openxmlformats.org/drawingml/2006/main" name="Tema de Office">
+  <a:themeElements>
+    <a:clrScheme name="Office">
+      <a:dk1>
+        <a:sysClr val="windowText" lastClr="000000"/>
+      </a:dk1>
+      <a:lt1>
+        <a:sysClr val="window" lastClr="FFFFFF"/>
+      </a:lt1>
+      <a:dk2>
+        <a:srgbClr val="44546A"/>
+      </a:dk2>
+      <a:lt2>
+        <a:srgbClr val="E7E6E6"/>
+      </a:lt2>
+      <a:accent1>
+        <a:srgbClr val="4472C4"/>
+      </a:accent1>
+      <a:accent2>
+        <a:srgbClr val="ED7D31"/>
+      </a:accent2>
+      <a:accent3>
+        <a:srgbClr val="A5A5A5"/>
+      </a:accent3>
+      <a:accent4>
+        <a:srgbClr val="FFC000"/>
+      </a:accent4>
+      <a:accent5>
+        <a:srgbClr val="5B9BD5"/>
+      </a:accent5>
+      <a:accent6>
+        <a:srgbClr val="70AD47"/>
+      </a:accent6>
+      <a:hlink>
+        <a:srgbClr val="0563C1"/>
+      </a:hlink>
+      <a:folHlink>
+        <a:srgbClr val="954F72"/>
+      </a:folHlink>
+    </a:clrScheme>
+    <a:fontScheme name="Office">
+      <a:majorFont>
+        <a:latin typeface="Calibri Light" panose="020F0302020204030204"/>
+        <a:ea typeface=""/>
+        <a:cs typeface=""/>
+        <a:font script="Jpan" typeface="游ゴシック Light"/>
+        <a:font script="Hang" typeface="맑은 고딕"/>
+        <a:font script="Hans" typeface="等线 Light"/>
+        <a:font script="Hant" typeface="新細明體"/>
+        <a:font script="Arab" typeface="Times New Roman"/>
+        <a:font script="Hebr" typeface="Times New Roman"/>
+        <a:font script="Thai" typeface="Angsana New"/>
+        <a:font script="Ethi" typeface="Nyala"/>
+        <a:font script="Beng" typeface="Vrinda"/>
+        <a:font script="Gujr" typeface="Shruti"/>
+        <a:font script="Khmr" typeface="MoolBoran"/>
+        <a:font script="Knda" typeface="Tunga"/>
+        <a:font script="Guru" typeface="Raavi"/>
+        <a:font script="Cans" typeface="Euphemia"/>
+        <a:font script="Cher" typeface="Plantagenet Cherokee"/>
+        <a:font script="Yiii" typeface="Microsoft Yi Baiti"/>
+        <a:font script="Tibt" typeface="Microsoft Himalaya"/>
+        <a:font script="Thaa" typeface="MV Boli"/>
+        <a:font script="Deva" typeface="Mangal"/>
+        <a:font script="Telu" typeface="Gautami"/>
+        <a:font script="Taml" typeface="Latha"/>
+        <a:font script="Syrc" typeface="Estrangelo Edessa"/>
+        <a:font script="Orya" typeface="Kalinga"/>
+        <a:font script="Mlym" typeface="Kartika"/>
+        <a:font script="Laoo" typeface="DokChampa"/>
+        <a:font script="Sinh" typeface="Iskoola Pota"/>
+        <a:font script="Mong" typeface="Mongolian Baiti"/>
+        <a:font script="Viet" typeface="Times New Roman"/>
+        <a:font script="Uigh" typeface="Microsoft Uighur"/>
+        <a:font script="Geor" typeface="Sylfaen"/>
+        <a:font script="Armn" typeface="Arial"/>
+        <a:font script="Bugi" typeface="Leelawadee UI"/>
+        <a:font script="Bopo" typeface="Microsoft JhengHei"/>
+        <a:font script="Java" typeface="Javanese Text"/>
+        <a:font script="Lisu" typeface="Segoe UI"/>
+        <a:font script="Mymr" typeface="Myanmar Text"/>
+        <a:font script="Nkoo" typeface="Ebrima"/>
+        <a:font script="Olck" typeface="Nirmala UI"/>
+        <a:font script="Osma" typeface="Ebrima"/>
+        <a:font script="Phag" typeface="Phagspa"/>
+        <a:font script="Syrn" typeface="Estrangelo Edessa"/>
+        <a:font script="Syrj" typeface="Estrangelo Edessa"/>
+        <a:font script="Syre" typeface="Estrangelo Edessa"/>
+        <a:font script="Sora" typeface="Nirmala UI"/>
+        <a:font script="Tale" typeface="Microsoft Tai Le"/>
+        <a:font script="Talu" typeface="Microsoft New Tai Lue"/>
+        <a:font script="Tfng" typeface="Ebrima"/>
+      </a:majorFont>
+      <a:minorFont>
+        <a:latin typeface="Calibri" panose="020F0502020204030204"/>
+        <a:ea typeface=""/>
+        <a:cs typeface=""/>
+        <a:font script="Jpan" typeface="游ゴシック"/>
+        <a:font script="Hang" typeface="맑은 고딕"/>
+        <a:font script="Hans" typeface="等线"/>
+        <a:font script="Hant" typeface="新細明體"/>
+        <a:font script="Arab" typeface="Arial"/>
+        <a:font script="Hebr" typeface="Arial"/>
+        <a:font script="Thai" typeface="Cordia New"/>
+        <a:font script="Ethi" typeface="Nyala"/>
+        <a:font script="Beng" typeface="Vrinda"/>
+        <a:font script="Gujr" typeface="Shruti"/>
+        <a:font script="Khmr" typeface="DaunPenh"/>
+        <a:font script="Knda" typeface="Tunga"/>
+        <a:font script="Guru" typeface="Raavi"/>
+        <a:font script="Cans" typeface="Euphemia"/>
+        <a:font script="Cher" typeface="Plantagenet Cherokee"/>
+        <a:font script="Yiii" typeface="Microsoft Yi Baiti"/>
+        <a:font script="Tibt" typeface="Microsoft Himalaya"/>
+        <a:font script="Thaa" typeface="MV Boli"/>
+        <a:font script="Deva" typeface="Mangal"/>
+        <a:font script="Telu" typeface="Gautami"/>
+        <a:font script="Taml" typeface="Latha"/>
+        <a:font script="Syrc" typeface="Estrangelo Edessa"/>
+        <a:font script="Orya" typeface="Kalinga"/>
+        <a:font script="Mlym" typeface="Kartika"/>
+        <a:font script="Laoo" typeface="DokChampa"/>
+        <a:font script="Sinh" typeface="Iskoola Pota"/>
+        <a:font script="Mong" typeface="Mongolian Baiti"/>
+        <a:font script="Viet" typeface="Arial"/>
+        <a:font script="Uigh" typeface="Microsoft Uighur"/>
+        <a:font script="Geor" typeface="Sylfaen"/>
+        <a:font script="Armn" typeface="Arial"/>
+        <a:font script="Bugi" typeface="Leelawadee UI"/>
+        <a:font script="Bopo" typeface="Microsoft JhengHei"/>
+        <a:font script="Java" typeface="Javanese Text"/>
+        <a:font script="Lisu" typeface="Segoe UI"/>
+        <a:font script="Mymr" typeface="Myanmar Text"/>
+        <a:font script="Nkoo" typeface="Ebrima"/>
+        <a:font script="Olck" typeface="Nirmala UI"/>
+        <a:font script="Osma" typeface="Ebrima"/>
+        <a:font script="Phag" typeface="Phagspa"/>
+        <a:font script="Syrn" typeface="Estrangelo Edessa"/>
+        <a:font script="Syrj" typeface="Estrangelo Edessa"/>
+        <a:font script="Syre" typeface="Estrangelo Edessa"/>
+        <a:font script="Sora" typeface="Nirmala UI"/>
+        <a:font script="Tale" typeface="Microsoft Tai Le"/>
+        <a:font script="Talu" typeface="Microsoft New Tai Lue"/>
+        <a:font script="Tfng" typeface="Ebrima"/>
+      </a:minorFont>
+    </a:fontScheme>
+    <a:fmtScheme name="Office">
+      <a:fillStyleLst>
+        <a:solidFill>
+          <a:schemeClr val="phClr"/>
+        </a:solidFill>
+        <a:gradFill rotWithShape="1">
+          <a:gsLst>
+            <a:gs pos="0">
+              <a:schemeClr val="phClr">
+                <a:lumMod val="110000"/>
+                <a:satMod val="105000"/>
+                <a:tint val="67000"/>
+              </a:schemeClr>
+            </a:gs>
+            <a:gs pos="50000">
+              <a:schemeClr val="phClr">
+                <a:lumMod val="105000"/>
+                <a:satMod val="103000"/>
+                <a:tint val="73000"/>
+              </a:schemeClr>
+            </a:gs>
+            <a:gs pos="100000">
+              <a:schemeClr val="phClr">
+                <a:lumMod val="105000"/>
+                <a:satMod val="109000"/>
+                <a:tint val="81000"/>
+              </a:schemeClr>
+            </a:gs>
+          </a:gsLst>
+          <a:lin ang="5400000" scaled="0"/>
+        </a:gradFill>
+        <a:gradFill rotWithShape="1">
+          <a:gsLst>
+            <a:gs pos="0">
+              <a:schemeClr val="phClr">
+                <a:satMod val="103000"/>
+                <a:lumMod val="102000"/>
+                <a:tint val="94000"/>
+              </a:schemeClr>
+            </a:gs>
+            <a:gs pos="50000">
+              <a:schemeClr val="phClr">
+                <a:satMod val="110000"/>
+                <a:lumMod val="100000"/>
+                <a:shade val="100000"/>
+              </a:schemeClr>
+            </a:gs>
+            <a:gs pos="100000">
+              <a:schemeClr val="phClr">
+                <a:lumMod val="99000"/>
+                <a:satMod val="120000"/>
+                <a:shade val="78000"/>
+              </a:schemeClr>
+            </a:gs>
+          </a:gsLst>
+          <a:lin ang="5400000" scaled="0"/>
+        </a:gradFill>
+      </a:fillStyleLst>
+      <a:lnStyleLst>
+        <a:ln w="6350" cap="flat" cmpd="sng" algn="ctr">
+          <a:solidFill>
+            <a:schemeClr val="phClr"/>
+          </a:solidFill>
+          <a:prstDash val="solid"/>
+          <a:miter lim="800000"/>
+        </a:ln>
+        <a:ln w="12700" cap="flat" cmpd="sng" algn="ctr">
+          <a:solidFill>
+            <a:schemeClr val="phClr"/>
+          </a:solidFill>
+          <a:prstDash val="solid"/>
+          <a:miter lim="800000"/>
+        </a:ln>
+        <a:ln w="19050" cap="flat" cmpd="sng" algn="ctr">
+          <a:solidFill>
+            <a:schemeClr val="phClr"/>
+          </a:solidFill>
+          <a:prstDash val="solid"/>
+          <a:miter lim="800000"/>
+        </a:ln>
+      </a:lnStyleLst>
+      <a:effectStyleLst>
+        <a:effectStyle>
+          <a:effectLst/>
+        </a:effectStyle>
+        <a:effectStyle>
+          <a:effectLst/>
+        </a:effectStyle>
+        <a:effectStyle>
+          <a:effectLst>
+            <a:outerShdw blurRad="57150" dist="19050" dir="5400000" algn="ctr" rotWithShape="0">
+              <a:srgbClr val="000000">
+                <a:alpha val="63000"/>
+              </a:srgbClr>
+            </a:outerShdw>
+          </a:effectLst>
+        </a:effectStyle>
+      </a:effectStyleLst>
+      <a:bgFillStyleLst>
+        <a:solidFill>
+          <a:schemeClr val="phClr"/>
+        </a:solidFill>
+        <a:solidFill>
+          <a:schemeClr val="phClr">
+            <a:tint val="95000"/>
+            <a:satMod val="170000"/>
+          </a:schemeClr>
+        </a:solidFill>
+        <a:gradFill rotWithShape="1">
+          <a:gsLst>
+            <a:gs pos="0">
+              <a:schemeClr val="phClr">
+                <a:tint val="93000"/>
+                <a:satMod val="150000"/>
+                <a:shade val="98000"/>
+                <a:lumMod val="102000"/>
+              </a:schemeClr>
+            </a:gs>
+            <a:gs pos="50000">
+              <a:schemeClr val="phClr">
+                <a:tint val="98000"/>
+                <a:satMod val="130000"/>
+                <a:shade val="90000"/>
+                <a:lumMod val="103000"/>
+              </a:schemeClr>
+            </a:gs>
+            <a:gs pos="100000">
+              <a:schemeClr val="phClr">
+                <a:shade val="63000"/>
+                <a:satMod val="120000"/>
+              </a:schemeClr>
+            </a:gs>
+          </a:gsLst>
+          <a:lin ang="5400000" scaled="0"/>
+        </a:gradFill>
+      </a:bgFillStyleLst>
+    </a:fmtScheme>
+  </a:themeElements>
+  <a:objectDefaults/>
+  <a:extraClrSchemeLst/>
+  <a:extLst>
+    <a:ext uri="{05A4C25C-085E-4340-85A3-A5531E510DB2}">
+      <thm15:themeFamily xmlns:thm15="http://schemas.microsoft.com/office/thememl/2012/main" name="Office Theme" id="{62F939B6-93AF-4DB8-9C6B-D6C7DFDC589F}" vid="{4A3C46E8-61CC-4603-A589-7422A47A8E4A}"/>
+    </a:ext>
+  </a:extLst>
+</a:theme>
 </file>
</xml_diff>